<commit_message>
update presentation for vendor directory
</commit_message>
<xml_diff>
--- a/vendor-directory/Vendor directory.pptx
+++ b/vendor-directory/Vendor directory.pptx
@@ -19,7 +19,6 @@
     <p:sldId id="264" r:id="rId16"/>
     <p:sldId id="265" r:id="rId17"/>
     <p:sldId id="266" r:id="rId18"/>
-    <p:sldId id="267" r:id="rId19"/>
   </p:sldIdLst>
   <p:sldSz cx="24384000" cy="13716000"/>
   <p:notesSz cx="6858000" cy="9144000"/>
@@ -5488,285 +5487,7 @@
       </p:grpSpPr>
       <p:sp>
         <p:nvSpPr>
-          <p:cNvPr id="479" name="Title 6"/>
-          <p:cNvSpPr txBox="1"/>
-          <p:nvPr>
-            <p:ph type="title"/>
-          </p:nvPr>
-        </p:nvSpPr>
-        <p:spPr>
-          <a:xfrm>
-            <a:off x="4096229" y="1119893"/>
-            <a:ext cx="16191542" cy="1288881"/>
-          </a:xfrm>
-          <a:prstGeom prst="rect">
-            <a:avLst/>
-          </a:prstGeom>
-        </p:spPr>
-        <p:txBody>
-          <a:bodyPr/>
-          <a:lstStyle>
-            <a:lvl1pPr algn="ctr">
-              <a:defRPr sz="8000">
-                <a:solidFill>
-                  <a:srgbClr val="66C2FF"/>
-                </a:solidFill>
-              </a:defRPr>
-            </a:lvl1pPr>
-          </a:lstStyle>
-          <a:p>
-            <a:pPr/>
-            <a:r>
-              <a:t>import path checking is disabled for vendor</a:t>
-            </a:r>
-          </a:p>
-        </p:txBody>
-      </p:sp>
-      <p:sp>
-        <p:nvSpPr>
-          <p:cNvPr id="480" name="Title 6"/>
-          <p:cNvSpPr txBox="1"/>
-          <p:nvPr/>
-        </p:nvSpPr>
-        <p:spPr>
-          <a:xfrm>
-            <a:off x="3902985" y="1119893"/>
-            <a:ext cx="16578030" cy="1288881"/>
-          </a:xfrm>
-          <a:prstGeom prst="rect">
-            <a:avLst/>
-          </a:prstGeom>
-          <a:ln w="12700">
-            <a:miter lim="400000"/>
-          </a:ln>
-          <a:extLst>
-            <a:ext uri="{C572A759-6A51-4108-AA02-DFA0A04FC94B}">
-              <ma14:wrappingTextBoxFlag xmlns:ma14="http://schemas.microsoft.com/office/mac/drawingml/2011/main" val="1"/>
-            </a:ext>
-          </a:extLst>
-        </p:spPr>
-        <p:txBody>
-          <a:bodyPr lIns="71437" tIns="71437" rIns="71437" bIns="71437">
-            <a:normAutofit fontScale="100000" lnSpcReduction="0"/>
-          </a:bodyPr>
-          <a:lstStyle>
-            <a:lvl1pPr algn="ctr">
-              <a:lnSpc>
-                <a:spcPct val="80000"/>
-              </a:lnSpc>
-              <a:spcBef>
-                <a:spcPts val="0"/>
-              </a:spcBef>
-              <a:defRPr cap="all" sz="8000">
-                <a:solidFill>
-                  <a:srgbClr val="66C2FF"/>
-                </a:solidFill>
-                <a:latin typeface="+mn-lt"/>
-                <a:ea typeface="+mn-ea"/>
-                <a:cs typeface="+mn-cs"/>
-                <a:sym typeface="DIN Condensed"/>
-              </a:defRPr>
-            </a:lvl1pPr>
-          </a:lstStyle>
-          <a:p>
-            <a:pPr/>
-            <a:r>
-              <a:t>import path checking is disabled for vendor</a:t>
-            </a:r>
-          </a:p>
-        </p:txBody>
-      </p:sp>
-      <p:pic>
-        <p:nvPicPr>
-          <p:cNvPr id="481" name="cubes.png" descr="cubes.png"/>
-          <p:cNvPicPr>
-            <a:picLocks noChangeAspect="1"/>
-          </p:cNvPicPr>
-          <p:nvPr/>
-        </p:nvPicPr>
-        <p:blipFill>
-          <a:blip r:embed="rId2">
-            <a:extLst/>
-          </a:blip>
-          <a:stretch>
-            <a:fillRect/>
-          </a:stretch>
-        </p:blipFill>
-        <p:spPr>
-          <a:xfrm>
-            <a:off x="22225000" y="2032000"/>
-            <a:ext cx="1270000" cy="1270000"/>
-          </a:xfrm>
-          <a:prstGeom prst="rect">
-            <a:avLst/>
-          </a:prstGeom>
-          <a:ln w="12700">
-            <a:miter lim="400000"/>
-          </a:ln>
-        </p:spPr>
-      </p:pic>
-      <p:pic>
-        <p:nvPicPr>
-          <p:cNvPr id="482" name="no-entry.png" descr="no-entry.png"/>
-          <p:cNvPicPr>
-            <a:picLocks noChangeAspect="1"/>
-          </p:cNvPicPr>
-          <p:nvPr/>
-        </p:nvPicPr>
-        <p:blipFill>
-          <a:blip r:embed="rId3">
-            <a:extLst/>
-          </a:blip>
-          <a:stretch>
-            <a:fillRect/>
-          </a:stretch>
-        </p:blipFill>
-        <p:spPr>
-          <a:xfrm>
-            <a:off x="8940800" y="4533900"/>
-            <a:ext cx="6502400" cy="6502400"/>
-          </a:xfrm>
-          <a:prstGeom prst="rect">
-            <a:avLst/>
-          </a:prstGeom>
-          <a:ln w="12700">
-            <a:miter lim="400000"/>
-          </a:ln>
-        </p:spPr>
-      </p:pic>
-    </p:spTree>
-  </p:cSld>
-  <p:clrMapOvr>
-    <a:masterClrMapping/>
-  </p:clrMapOvr>
-  <mc:AlternateContent xmlns:mc="http://schemas.openxmlformats.org/markup-compatibility/2006">
-    <mc:Choice xmlns:p14="http://schemas.microsoft.com/office/powerpoint/2010/main" Requires="p14">
-      <p:transition spd="fast" advClick="1" p14:dur="699">
-        <p:push dir="l"/>
-      </p:transition>
-    </mc:Choice>
-    <mc:Fallback>
-      <p:transition spd="fast">
-        <p:fade/>
-      </p:transition>
-    </mc:Fallback>
-  </mc:AlternateContent>
-  <p:timing>
-    <p:tnLst>
-      <p:par>
-        <p:cTn id="1" nodeType="tmRoot" restart="never" dur="indefinite" fill="hold">
-          <p:childTnLst>
-            <p:seq concurrent="1" prevAc="none" nextAc="seek">
-              <p:cTn id="2" nodeType="mainSeq" dur="indefinite" fill="hold">
-                <p:childTnLst>
-                  <p:par>
-                    <p:cTn id="3" fill="hold">
-                      <p:stCondLst>
-                        <p:cond delay="indefinite"/>
-                        <p:cond evt="onBegin">
-                          <p:tn val="2"/>
-                        </p:cond>
-                      </p:stCondLst>
-                      <p:childTnLst>
-                        <p:par>
-                          <p:cTn id="4" fill="hold">
-                            <p:stCondLst>
-                              <p:cond delay="0"/>
-                            </p:stCondLst>
-                            <p:childTnLst>
-                              <p:par>
-                                <p:cTn id="5" presetClass="emph" nodeType="afterEffect" presetSubtype="0" presetID="35" grpId="1" repeatCount="2000" fill="hold">
-                                  <p:stCondLst>
-                                    <p:cond delay="0"/>
-                                  </p:stCondLst>
-                                  <p:childTnLst>
-                                    <p:anim calcmode="discrete" valueType="str">
-                                      <p:cBhvr>
-                                        <p:cTn id="6" dur="600" fill="hold"/>
-                                        <p:tgtEl>
-                                          <p:spTgt spid="482"/>
-                                        </p:tgtEl>
-                                        <p:attrNameLst>
-                                          <p:attrName>style.visibility</p:attrName>
-                                        </p:attrNameLst>
-                                      </p:cBhvr>
-                                      <p:tavLst>
-                                        <p:tav tm="0">
-                                          <p:val>
-                                            <p:strVal val="hidden"/>
-                                          </p:val>
-                                        </p:tav>
-                                        <p:tav tm="50000">
-                                          <p:val>
-                                            <p:strVal val="visible"/>
-                                          </p:val>
-                                        </p:tav>
-                                      </p:tavLst>
-                                    </p:anim>
-                                  </p:childTnLst>
-                                </p:cTn>
-                              </p:par>
-                            </p:childTnLst>
-                          </p:cTn>
-                        </p:par>
-                      </p:childTnLst>
-                    </p:cTn>
-                  </p:par>
-                </p:childTnLst>
-              </p:cTn>
-              <p:prevCondLst>
-                <p:cond evt="onPrev">
-                  <p:tgtEl>
-                    <p:sldTgt/>
-                  </p:tgtEl>
-                </p:cond>
-              </p:prevCondLst>
-              <p:nextCondLst>
-                <p:cond evt="onNext">
-                  <p:tgtEl>
-                    <p:sldTgt/>
-                  </p:tgtEl>
-                </p:cond>
-              </p:nextCondLst>
-            </p:seq>
-          </p:childTnLst>
-        </p:cTn>
-      </p:par>
-    </p:tnLst>
-    <p:bldLst>
-      <p:bldP build="whole" bldLvl="1" animBg="1" rev="0" advAuto="0" spid="482" grpId="1"/>
-    </p:bldLst>
-  </p:timing>
-</p:sld>
-</file>
-
-<file path=ppt/slides/slide11.xml><?xml version="1.0" encoding="utf-8"?>
-<p:sld xmlns:a="http://schemas.openxmlformats.org/drawingml/2006/main" xmlns:r="http://schemas.openxmlformats.org/officeDocument/2006/relationships" xmlns:p="http://schemas.openxmlformats.org/presentationml/2006/main" xmlns:m="http://schemas.openxmlformats.org/officeDocument/2006/math" xmlns:a14="http://schemas.microsoft.com/office/drawing/2010/main" showMasterSp="1" showMasterPhAnim="1">
-  <p:cSld>
-    <p:bg>
-      <p:bgPr>
-        <a:solidFill>
-          <a:srgbClr val="002833"/>
-        </a:solidFill>
-      </p:bgPr>
-    </p:bg>
-    <p:spTree>
-      <p:nvGrpSpPr>
-        <p:cNvPr id="1" name=""/>
-        <p:cNvGrpSpPr/>
-        <p:nvPr/>
-      </p:nvGrpSpPr>
-      <p:grpSpPr>
-        <a:xfrm>
-          <a:off x="0" y="0"/>
-          <a:ext cx="0" cy="0"/>
-          <a:chOff x="0" y="0"/>
-          <a:chExt cx="0" cy="0"/>
-        </a:xfrm>
-      </p:grpSpPr>
-      <p:sp>
-        <p:nvSpPr>
-          <p:cNvPr id="484" name="Title 6"/>
+          <p:cNvPr id="477" name="Title 6"/>
           <p:cNvSpPr txBox="1"/>
           <p:nvPr>
             <p:ph type="title"/>
@@ -5802,7 +5523,7 @@
       </p:sp>
       <p:pic>
         <p:nvPicPr>
-          <p:cNvPr id="485" name="code.png" descr="code.png"/>
+          <p:cNvPr id="478" name="code.png" descr="code.png"/>
           <p:cNvPicPr>
             <a:picLocks noChangeAspect="1"/>
           </p:cNvPicPr>
@@ -5831,7 +5552,7 @@
       </p:pic>
       <p:pic>
         <p:nvPicPr>
-          <p:cNvPr id="486" name="server.png" descr="server.png"/>
+          <p:cNvPr id="479" name="server.png" descr="server.png"/>
           <p:cNvPicPr>
             <a:picLocks noChangeAspect="1"/>
           </p:cNvPicPr>
@@ -5860,7 +5581,7 @@
       </p:pic>
       <p:pic>
         <p:nvPicPr>
-          <p:cNvPr id="487" name="packing.png" descr="packing.png"/>
+          <p:cNvPr id="480" name="packing.png" descr="packing.png"/>
           <p:cNvPicPr>
             <a:picLocks noChangeAspect="1"/>
           </p:cNvPicPr>
@@ -5889,7 +5610,7 @@
       </p:pic>
       <p:pic>
         <p:nvPicPr>
-          <p:cNvPr id="488" name="bitbucket-logo.png" descr="bitbucket-logo.png"/>
+          <p:cNvPr id="481" name="bitbucket-logo.png" descr="bitbucket-logo.png"/>
           <p:cNvPicPr>
             <a:picLocks noChangeAspect="1"/>
           </p:cNvPicPr>
@@ -5906,7 +5627,7 @@
         <p:spPr>
           <a:xfrm>
             <a:off x="8264720" y="6363895"/>
-            <a:ext cx="2143222" cy="2143222"/>
+            <a:ext cx="2143222" cy="2143223"/>
           </a:xfrm>
           <a:prstGeom prst="rect">
             <a:avLst/>
@@ -5918,7 +5639,7 @@
       </p:pic>
       <p:pic>
         <p:nvPicPr>
-          <p:cNvPr id="489" name="github.png" descr="github.png"/>
+          <p:cNvPr id="482" name="github.png" descr="github.png"/>
           <p:cNvPicPr>
             <a:picLocks noChangeAspect="1"/>
           </p:cNvPicPr>
@@ -5947,7 +5668,7 @@
       </p:pic>
       <p:pic>
         <p:nvPicPr>
-          <p:cNvPr id="490" name="gitlab-icon-rgb.png" descr="gitlab-icon-rgb.png"/>
+          <p:cNvPr id="483" name="gitlab-icon-rgb.png" descr="gitlab-icon-rgb.png"/>
           <p:cNvPicPr>
             <a:picLocks noChangeAspect="1"/>
           </p:cNvPicPr>
@@ -5976,7 +5697,7 @@
       </p:pic>
       <p:grpSp>
         <p:nvGrpSpPr>
-          <p:cNvPr id="494" name="Group"/>
+          <p:cNvPr id="487" name="Group"/>
           <p:cNvGrpSpPr/>
           <p:nvPr/>
         </p:nvGrpSpPr>
@@ -5990,7 +5711,7 @@
         </p:grpSpPr>
         <p:sp>
           <p:nvSpPr>
-            <p:cNvPr id="491" name="Rectangle"/>
+            <p:cNvPr id="484" name="Rectangle"/>
             <p:cNvSpPr/>
             <p:nvPr/>
           </p:nvSpPr>
@@ -6039,7 +5760,7 @@
         </p:sp>
         <p:sp>
           <p:nvSpPr>
-            <p:cNvPr id="492" name="package go.uber.org/zap // import &quot;go.uber.org/zap&quot;"/>
+            <p:cNvPr id="485" name="package go.uber.org/zap // import &quot;go.uber.org/zap&quot;"/>
             <p:cNvSpPr txBox="1"/>
             <p:nvPr/>
           </p:nvSpPr>
@@ -6111,7 +5832,7 @@
         </p:sp>
         <p:sp>
           <p:nvSpPr>
-            <p:cNvPr id="493" name="package go.uber.org/zap /* import &quot;go.uber.org/zap&quot; */"/>
+            <p:cNvPr id="486" name="package go.uber.org/zap /* import &quot;go.uber.org/zap&quot; */"/>
             <p:cNvSpPr txBox="1"/>
             <p:nvPr/>
           </p:nvSpPr>
@@ -6181,7 +5902,7 @@
       </p:grpSp>
       <p:pic>
         <p:nvPicPr>
-          <p:cNvPr id="495" name="Line Line" descr="Line Line"/>
+          <p:cNvPr id="488" name="Line Line" descr="Line Line"/>
           <p:cNvPicPr>
             <a:picLocks noChangeAspect="0"/>
           </p:cNvPicPr>
@@ -6197,8 +5918,8 @@
         </p:blipFill>
         <p:spPr>
           <a:xfrm>
-            <a:off x="3168980" y="7232711"/>
-            <a:ext cx="1181070" cy="405591"/>
+            <a:off x="3168980" y="7232710"/>
+            <a:ext cx="1181070" cy="405592"/>
           </a:xfrm>
           <a:prstGeom prst="rect">
             <a:avLst/>
@@ -6207,7 +5928,7 @@
       </p:pic>
       <p:pic>
         <p:nvPicPr>
-          <p:cNvPr id="497" name="Line Line" descr="Line Line"/>
+          <p:cNvPr id="490" name="Line Line" descr="Line Line"/>
           <p:cNvPicPr>
             <a:picLocks noChangeAspect="0"/>
           </p:cNvPicPr>
@@ -6223,8 +5944,8 @@
         </p:blipFill>
         <p:spPr>
           <a:xfrm>
-            <a:off x="6908422" y="7251213"/>
-            <a:ext cx="1181070" cy="405591"/>
+            <a:off x="6908422" y="7251212"/>
+            <a:ext cx="1181070" cy="405592"/>
           </a:xfrm>
           <a:prstGeom prst="rect">
             <a:avLst/>
@@ -6233,7 +5954,7 @@
       </p:pic>
       <p:pic>
         <p:nvPicPr>
-          <p:cNvPr id="499" name="Line Line" descr="Line Line"/>
+          <p:cNvPr id="492" name="Line Line" descr="Line Line"/>
           <p:cNvPicPr>
             <a:picLocks noChangeAspect="0"/>
           </p:cNvPicPr>
@@ -6259,7 +5980,7 @@
       </p:pic>
       <p:pic>
         <p:nvPicPr>
-          <p:cNvPr id="501" name="Line Line" descr="Line Line"/>
+          <p:cNvPr id="494" name="Line Line" descr="Line Line"/>
           <p:cNvPicPr>
             <a:picLocks noChangeAspect="0"/>
           </p:cNvPicPr>
@@ -6285,7 +6006,7 @@
       </p:pic>
       <p:pic>
         <p:nvPicPr>
-          <p:cNvPr id="503" name="Line Line" descr="Line Line"/>
+          <p:cNvPr id="496" name="Line Line" descr="Line Line"/>
           <p:cNvPicPr>
             <a:picLocks noChangeAspect="0"/>
           </p:cNvPicPr>
@@ -6301,8 +6022,8 @@
         </p:blipFill>
         <p:spPr>
           <a:xfrm>
-            <a:off x="10601923" y="7251213"/>
-            <a:ext cx="1181070" cy="405591"/>
+            <a:off x="10601923" y="7251212"/>
+            <a:ext cx="1181070" cy="405592"/>
           </a:xfrm>
           <a:prstGeom prst="rect">
             <a:avLst/>
@@ -6311,7 +6032,7 @@
       </p:pic>
       <p:pic>
         <p:nvPicPr>
-          <p:cNvPr id="505" name="Line Line" descr="Line Line"/>
+          <p:cNvPr id="498" name="Line Line" descr="Line Line"/>
           <p:cNvPicPr>
             <a:picLocks noChangeAspect="0"/>
           </p:cNvPicPr>
@@ -6337,7 +6058,7 @@
       </p:pic>
       <p:pic>
         <p:nvPicPr>
-          <p:cNvPr id="507" name="Line Line" descr="Line Line"/>
+          <p:cNvPr id="500" name="Line Line" descr="Line Line"/>
           <p:cNvPicPr>
             <a:picLocks noChangeAspect="0"/>
           </p:cNvPicPr>
@@ -6354,7 +6075,7 @@
         <p:spPr>
           <a:xfrm rot="17906960">
             <a:off x="9983596" y="8795884"/>
-            <a:ext cx="2402343" cy="405592"/>
+            <a:ext cx="2402343" cy="405591"/>
           </a:xfrm>
           <a:prstGeom prst="rect">
             <a:avLst/>
@@ -6363,7 +6084,7 @@
       </p:pic>
       <p:pic>
         <p:nvPicPr>
-          <p:cNvPr id="509" name="Line Line" descr="Line Line"/>
+          <p:cNvPr id="502" name="Line Line" descr="Line Line"/>
           <p:cNvPicPr>
             <a:picLocks noChangeAspect="0"/>
           </p:cNvPicPr>
@@ -6379,8 +6100,8 @@
         </p:blipFill>
         <p:spPr>
           <a:xfrm>
-            <a:off x="14102598" y="7251213"/>
-            <a:ext cx="1181069" cy="405591"/>
+            <a:off x="14102598" y="7251212"/>
+            <a:ext cx="1181069" cy="405592"/>
           </a:xfrm>
           <a:prstGeom prst="rect">
             <a:avLst/>
@@ -6389,7 +6110,7 @@
       </p:pic>
       <p:pic>
         <p:nvPicPr>
-          <p:cNvPr id="527" name="Connection Line" descr="Connection Line"/>
+          <p:cNvPr id="520" name="Connection Line" descr="Connection Line"/>
           <p:cNvPicPr>
             <a:picLocks noChangeAspect="0"/>
           </p:cNvPicPr>
@@ -6406,7 +6127,7 @@
         <p:spPr>
           <a:xfrm>
             <a:off x="3156280" y="7872356"/>
-            <a:ext cx="5189370" cy="3381581"/>
+            <a:ext cx="5189370" cy="3381580"/>
           </a:xfrm>
           <a:prstGeom prst="rect">
             <a:avLst/>
@@ -6415,7 +6136,7 @@
       </p:pic>
       <p:pic>
         <p:nvPicPr>
-          <p:cNvPr id="529" name="Connection Line" descr="Connection Line"/>
+          <p:cNvPr id="522" name="Connection Line" descr="Connection Line"/>
           <p:cNvPicPr>
             <a:picLocks noChangeAspect="0"/>
           </p:cNvPicPr>
@@ -6441,7 +6162,7 @@
       </p:pic>
       <p:grpSp>
         <p:nvGrpSpPr>
-          <p:cNvPr id="515" name="Group"/>
+          <p:cNvPr id="508" name="Group"/>
           <p:cNvGrpSpPr/>
           <p:nvPr/>
         </p:nvGrpSpPr>
@@ -6455,7 +6176,7 @@
         </p:grpSpPr>
         <p:sp>
           <p:nvSpPr>
-            <p:cNvPr id="513" name="Rectangle"/>
+            <p:cNvPr id="506" name="Rectangle"/>
             <p:cNvSpPr/>
             <p:nvPr/>
           </p:nvSpPr>
@@ -6504,7 +6225,7 @@
         </p:sp>
         <p:sp>
           <p:nvSpPr>
-            <p:cNvPr id="514" name="Rectangle"/>
+            <p:cNvPr id="507" name="Rectangle"/>
             <p:cNvSpPr/>
             <p:nvPr/>
           </p:nvSpPr>
@@ -6554,7 +6275,7 @@
       </p:grpSp>
       <p:grpSp>
         <p:nvGrpSpPr>
-          <p:cNvPr id="518" name="Group"/>
+          <p:cNvPr id="511" name="Group"/>
           <p:cNvGrpSpPr/>
           <p:nvPr/>
         </p:nvGrpSpPr>
@@ -6568,7 +6289,7 @@
         </p:grpSpPr>
         <p:sp>
           <p:nvSpPr>
-            <p:cNvPr id="516" name="Rectangle"/>
+            <p:cNvPr id="509" name="Rectangle"/>
             <p:cNvSpPr/>
             <p:nvPr/>
           </p:nvSpPr>
@@ -6617,7 +6338,7 @@
         </p:sp>
         <p:sp>
           <p:nvSpPr>
-            <p:cNvPr id="517" name="Rectangle"/>
+            <p:cNvPr id="510" name="Rectangle"/>
             <p:cNvSpPr/>
             <p:nvPr/>
           </p:nvSpPr>
@@ -6667,7 +6388,7 @@
       </p:grpSp>
       <p:sp>
         <p:nvSpPr>
-          <p:cNvPr id="519" name="go.uber.org"/>
+          <p:cNvPr id="512" name="go.uber.org"/>
           <p:cNvSpPr txBox="1"/>
           <p:nvPr/>
         </p:nvSpPr>
@@ -6715,7 +6436,7 @@
       </p:sp>
       <p:sp>
         <p:nvSpPr>
-          <p:cNvPr id="520" name="PROJECT"/>
+          <p:cNvPr id="513" name="PROJECT"/>
           <p:cNvSpPr txBox="1"/>
           <p:nvPr/>
         </p:nvSpPr>
@@ -6763,7 +6484,7 @@
       </p:sp>
       <p:sp>
         <p:nvSpPr>
-          <p:cNvPr id="521" name="GitHub"/>
+          <p:cNvPr id="514" name="GitHub"/>
           <p:cNvSpPr txBox="1"/>
           <p:nvPr/>
         </p:nvSpPr>
@@ -6811,7 +6532,7 @@
       </p:sp>
       <p:sp>
         <p:nvSpPr>
-          <p:cNvPr id="522" name="BitBucket"/>
+          <p:cNvPr id="515" name="BitBucket"/>
           <p:cNvSpPr txBox="1"/>
           <p:nvPr/>
         </p:nvSpPr>
@@ -6859,7 +6580,7 @@
       </p:sp>
       <p:sp>
         <p:nvSpPr>
-          <p:cNvPr id="523" name="GitLab"/>
+          <p:cNvPr id="516" name="GitLab"/>
           <p:cNvSpPr txBox="1"/>
           <p:nvPr/>
         </p:nvSpPr>
@@ -6907,7 +6628,7 @@
       </p:sp>
       <p:sp>
         <p:nvSpPr>
-          <p:cNvPr id="524" name="package"/>
+          <p:cNvPr id="517" name="package"/>
           <p:cNvSpPr txBox="1"/>
           <p:nvPr/>
         </p:nvSpPr>
@@ -6955,7 +6676,7 @@
       </p:sp>
       <p:pic>
         <p:nvPicPr>
-          <p:cNvPr id="525" name="cubes.png" descr="cubes.png"/>
+          <p:cNvPr id="518" name="cubes.png" descr="cubes.png"/>
           <p:cNvPicPr>
             <a:picLocks noChangeAspect="1"/>
           </p:cNvPicPr>
@@ -6984,14 +6705,14 @@
       </p:pic>
       <p:sp>
         <p:nvSpPr>
-          <p:cNvPr id="526" name="Rectangle"/>
+          <p:cNvPr id="519" name="Rectangle"/>
           <p:cNvSpPr/>
           <p:nvPr/>
         </p:nvSpPr>
         <p:spPr>
           <a:xfrm>
-            <a:off x="19188925" y="6904852"/>
-            <a:ext cx="4448611" cy="1035908"/>
+            <a:off x="19188926" y="6904852"/>
+            <a:ext cx="4448610" cy="1035908"/>
           </a:xfrm>
           <a:prstGeom prst="rect">
             <a:avLst/>
@@ -7080,7 +6801,7 @@
                                       <p:cBhvr>
                                         <p:cTn id="6" fill="hold"/>
                                         <p:tgtEl>
-                                          <p:spTgt spid="485"/>
+                                          <p:spTgt spid="478"/>
                                         </p:tgtEl>
                                         <p:attrNameLst>
                                           <p:attrName>style.visibility</p:attrName>
@@ -7094,7 +6815,7 @@
                                       <p:cBhvr>
                                         <p:cTn id="7" dur="600"/>
                                         <p:tgtEl>
-                                          <p:spTgt spid="485"/>
+                                          <p:spTgt spid="478"/>
                                         </p:tgtEl>
                                       </p:cBhvr>
                                     </p:animEffect>
@@ -7123,7 +6844,7 @@
                                       <p:cBhvr>
                                         <p:cTn id="10" fill="hold"/>
                                         <p:tgtEl>
-                                          <p:spTgt spid="520"/>
+                                          <p:spTgt spid="513"/>
                                         </p:tgtEl>
                                         <p:attrNameLst>
                                           <p:attrName>style.visibility</p:attrName>
@@ -7137,7 +6858,7 @@
                                       <p:cBhvr>
                                         <p:cTn id="11" dur="600" fill="hold"/>
                                         <p:tgtEl>
-                                          <p:spTgt spid="520"/>
+                                          <p:spTgt spid="513"/>
                                         </p:tgtEl>
                                         <p:attrNameLst>
                                           <p:attrName>ppt_w</p:attrName>
@@ -7160,7 +6881,7 @@
                                       <p:cBhvr>
                                         <p:cTn id="12" dur="600" fill="hold"/>
                                         <p:tgtEl>
-                                          <p:spTgt spid="520"/>
+                                          <p:spTgt spid="513"/>
                                         </p:tgtEl>
                                         <p:attrNameLst>
                                           <p:attrName>ppt_h</p:attrName>
@@ -7204,7 +6925,7 @@
                                       <p:cBhvr>
                                         <p:cTn id="15" fill="hold"/>
                                         <p:tgtEl>
-                                          <p:spTgt spid="495"/>
+                                          <p:spTgt spid="488"/>
                                         </p:tgtEl>
                                         <p:attrNameLst>
                                           <p:attrName>style.visibility</p:attrName>
@@ -7218,7 +6939,7 @@
                                       <p:cBhvr>
                                         <p:cTn id="16" dur="600"/>
                                         <p:tgtEl>
-                                          <p:spTgt spid="495"/>
+                                          <p:spTgt spid="488"/>
                                         </p:tgtEl>
                                       </p:cBhvr>
                                     </p:animEffect>
@@ -7247,7 +6968,7 @@
                                       <p:cBhvr>
                                         <p:cTn id="19" fill="hold"/>
                                         <p:tgtEl>
-                                          <p:spTgt spid="486"/>
+                                          <p:spTgt spid="479"/>
                                         </p:tgtEl>
                                         <p:attrNameLst>
                                           <p:attrName>style.visibility</p:attrName>
@@ -7261,7 +6982,7 @@
                                       <p:cBhvr>
                                         <p:cTn id="20" dur="600"/>
                                         <p:tgtEl>
-                                          <p:spTgt spid="486"/>
+                                          <p:spTgt spid="479"/>
                                         </p:tgtEl>
                                       </p:cBhvr>
                                     </p:animEffect>
@@ -7290,7 +7011,7 @@
                                       <p:cBhvr>
                                         <p:cTn id="23" fill="hold"/>
                                         <p:tgtEl>
-                                          <p:spTgt spid="519"/>
+                                          <p:spTgt spid="512"/>
                                         </p:tgtEl>
                                         <p:attrNameLst>
                                           <p:attrName>style.visibility</p:attrName>
@@ -7304,7 +7025,7 @@
                                       <p:cBhvr>
                                         <p:cTn id="24" dur="600" fill="hold"/>
                                         <p:tgtEl>
-                                          <p:spTgt spid="519"/>
+                                          <p:spTgt spid="512"/>
                                         </p:tgtEl>
                                         <p:attrNameLst>
                                           <p:attrName>ppt_w</p:attrName>
@@ -7327,7 +7048,7 @@
                                       <p:cBhvr>
                                         <p:cTn id="25" dur="600" fill="hold"/>
                                         <p:tgtEl>
-                                          <p:spTgt spid="519"/>
+                                          <p:spTgt spid="512"/>
                                         </p:tgtEl>
                                         <p:attrNameLst>
                                           <p:attrName>ppt_h</p:attrName>
@@ -7371,7 +7092,7 @@
                                       <p:cBhvr>
                                         <p:cTn id="28" fill="hold"/>
                                         <p:tgtEl>
-                                          <p:spTgt spid="499"/>
+                                          <p:spTgt spid="492"/>
                                         </p:tgtEl>
                                         <p:attrNameLst>
                                           <p:attrName>style.visibility</p:attrName>
@@ -7385,7 +7106,7 @@
                                       <p:cBhvr>
                                         <p:cTn id="29" dur="600"/>
                                         <p:tgtEl>
-                                          <p:spTgt spid="499"/>
+                                          <p:spTgt spid="492"/>
                                         </p:tgtEl>
                                       </p:cBhvr>
                                     </p:animEffect>
@@ -7414,7 +7135,7 @@
                                       <p:cBhvr>
                                         <p:cTn id="32" fill="hold"/>
                                         <p:tgtEl>
-                                          <p:spTgt spid="489"/>
+                                          <p:spTgt spid="482"/>
                                         </p:tgtEl>
                                         <p:attrNameLst>
                                           <p:attrName>style.visibility</p:attrName>
@@ -7428,7 +7149,7 @@
                                       <p:cBhvr>
                                         <p:cTn id="33" dur="600"/>
                                         <p:tgtEl>
-                                          <p:spTgt spid="489"/>
+                                          <p:spTgt spid="482"/>
                                         </p:tgtEl>
                                       </p:cBhvr>
                                     </p:animEffect>
@@ -7457,7 +7178,7 @@
                                       <p:cBhvr>
                                         <p:cTn id="36" fill="hold"/>
                                         <p:tgtEl>
-                                          <p:spTgt spid="521"/>
+                                          <p:spTgt spid="514"/>
                                         </p:tgtEl>
                                         <p:attrNameLst>
                                           <p:attrName>style.visibility</p:attrName>
@@ -7471,7 +7192,7 @@
                                       <p:cBhvr>
                                         <p:cTn id="37" dur="600" fill="hold"/>
                                         <p:tgtEl>
-                                          <p:spTgt spid="521"/>
+                                          <p:spTgt spid="514"/>
                                         </p:tgtEl>
                                         <p:attrNameLst>
                                           <p:attrName>ppt_w</p:attrName>
@@ -7494,7 +7215,7 @@
                                       <p:cBhvr>
                                         <p:cTn id="38" dur="600" fill="hold"/>
                                         <p:tgtEl>
-                                          <p:spTgt spid="521"/>
+                                          <p:spTgt spid="514"/>
                                         </p:tgtEl>
                                         <p:attrNameLst>
                                           <p:attrName>ppt_h</p:attrName>
@@ -7538,7 +7259,7 @@
                                       <p:cBhvr>
                                         <p:cTn id="41" fill="hold"/>
                                         <p:tgtEl>
-                                          <p:spTgt spid="497"/>
+                                          <p:spTgt spid="490"/>
                                         </p:tgtEl>
                                         <p:attrNameLst>
                                           <p:attrName>style.visibility</p:attrName>
@@ -7552,7 +7273,7 @@
                                       <p:cBhvr>
                                         <p:cTn id="42" dur="600"/>
                                         <p:tgtEl>
-                                          <p:spTgt spid="497"/>
+                                          <p:spTgt spid="490"/>
                                         </p:tgtEl>
                                       </p:cBhvr>
                                     </p:animEffect>
@@ -7581,7 +7302,7 @@
                                       <p:cBhvr>
                                         <p:cTn id="45" fill="hold"/>
                                         <p:tgtEl>
-                                          <p:spTgt spid="488"/>
+                                          <p:spTgt spid="481"/>
                                         </p:tgtEl>
                                         <p:attrNameLst>
                                           <p:attrName>style.visibility</p:attrName>
@@ -7595,7 +7316,7 @@
                                       <p:cBhvr>
                                         <p:cTn id="46" dur="600"/>
                                         <p:tgtEl>
-                                          <p:spTgt spid="488"/>
+                                          <p:spTgt spid="481"/>
                                         </p:tgtEl>
                                       </p:cBhvr>
                                     </p:animEffect>
@@ -7624,7 +7345,7 @@
                                       <p:cBhvr>
                                         <p:cTn id="49" fill="hold"/>
                                         <p:tgtEl>
-                                          <p:spTgt spid="522"/>
+                                          <p:spTgt spid="515"/>
                                         </p:tgtEl>
                                         <p:attrNameLst>
                                           <p:attrName>style.visibility</p:attrName>
@@ -7638,7 +7359,7 @@
                                       <p:cBhvr>
                                         <p:cTn id="50" dur="600" fill="hold"/>
                                         <p:tgtEl>
-                                          <p:spTgt spid="522"/>
+                                          <p:spTgt spid="515"/>
                                         </p:tgtEl>
                                         <p:attrNameLst>
                                           <p:attrName>ppt_w</p:attrName>
@@ -7661,7 +7382,7 @@
                                       <p:cBhvr>
                                         <p:cTn id="51" dur="600" fill="hold"/>
                                         <p:tgtEl>
-                                          <p:spTgt spid="522"/>
+                                          <p:spTgt spid="515"/>
                                         </p:tgtEl>
                                         <p:attrNameLst>
                                           <p:attrName>ppt_h</p:attrName>
@@ -7705,7 +7426,7 @@
                                       <p:cBhvr>
                                         <p:cTn id="54" fill="hold"/>
                                         <p:tgtEl>
-                                          <p:spTgt spid="501"/>
+                                          <p:spTgt spid="494"/>
                                         </p:tgtEl>
                                         <p:attrNameLst>
                                           <p:attrName>style.visibility</p:attrName>
@@ -7719,7 +7440,7 @@
                                       <p:cBhvr>
                                         <p:cTn id="55" dur="600"/>
                                         <p:tgtEl>
-                                          <p:spTgt spid="501"/>
+                                          <p:spTgt spid="494"/>
                                         </p:tgtEl>
                                       </p:cBhvr>
                                     </p:animEffect>
@@ -7748,7 +7469,7 @@
                                       <p:cBhvr>
                                         <p:cTn id="58" fill="hold"/>
                                         <p:tgtEl>
-                                          <p:spTgt spid="490"/>
+                                          <p:spTgt spid="483"/>
                                         </p:tgtEl>
                                         <p:attrNameLst>
                                           <p:attrName>style.visibility</p:attrName>
@@ -7762,7 +7483,7 @@
                                       <p:cBhvr>
                                         <p:cTn id="59" dur="600"/>
                                         <p:tgtEl>
-                                          <p:spTgt spid="490"/>
+                                          <p:spTgt spid="483"/>
                                         </p:tgtEl>
                                       </p:cBhvr>
                                     </p:animEffect>
@@ -7791,7 +7512,7 @@
                                       <p:cBhvr>
                                         <p:cTn id="62" fill="hold"/>
                                         <p:tgtEl>
-                                          <p:spTgt spid="523"/>
+                                          <p:spTgt spid="516"/>
                                         </p:tgtEl>
                                         <p:attrNameLst>
                                           <p:attrName>style.visibility</p:attrName>
@@ -7805,7 +7526,7 @@
                                       <p:cBhvr>
                                         <p:cTn id="63" dur="600" fill="hold"/>
                                         <p:tgtEl>
-                                          <p:spTgt spid="523"/>
+                                          <p:spTgt spid="516"/>
                                         </p:tgtEl>
                                         <p:attrNameLst>
                                           <p:attrName>ppt_w</p:attrName>
@@ -7828,7 +7549,7 @@
                                       <p:cBhvr>
                                         <p:cTn id="64" dur="600" fill="hold"/>
                                         <p:tgtEl>
-                                          <p:spTgt spid="523"/>
+                                          <p:spTgt spid="516"/>
                                         </p:tgtEl>
                                         <p:attrNameLst>
                                           <p:attrName>ppt_h</p:attrName>
@@ -7872,7 +7593,7 @@
                                       <p:cBhvr>
                                         <p:cTn id="67" fill="hold"/>
                                         <p:tgtEl>
-                                          <p:spTgt spid="505"/>
+                                          <p:spTgt spid="498"/>
                                         </p:tgtEl>
                                         <p:attrNameLst>
                                           <p:attrName>style.visibility</p:attrName>
@@ -7886,7 +7607,7 @@
                                       <p:cBhvr>
                                         <p:cTn id="68" dur="600"/>
                                         <p:tgtEl>
-                                          <p:spTgt spid="505"/>
+                                          <p:spTgt spid="498"/>
                                         </p:tgtEl>
                                       </p:cBhvr>
                                     </p:animEffect>
@@ -7915,7 +7636,7 @@
                                       <p:cBhvr>
                                         <p:cTn id="71" fill="hold"/>
                                         <p:tgtEl>
-                                          <p:spTgt spid="503"/>
+                                          <p:spTgt spid="496"/>
                                         </p:tgtEl>
                                         <p:attrNameLst>
                                           <p:attrName>style.visibility</p:attrName>
@@ -7929,7 +7650,7 @@
                                       <p:cBhvr>
                                         <p:cTn id="72" dur="600"/>
                                         <p:tgtEl>
-                                          <p:spTgt spid="503"/>
+                                          <p:spTgt spid="496"/>
                                         </p:tgtEl>
                                       </p:cBhvr>
                                     </p:animEffect>
@@ -7958,7 +7679,7 @@
                                       <p:cBhvr>
                                         <p:cTn id="75" fill="hold"/>
                                         <p:tgtEl>
-                                          <p:spTgt spid="507"/>
+                                          <p:spTgt spid="500"/>
                                         </p:tgtEl>
                                         <p:attrNameLst>
                                           <p:attrName>style.visibility</p:attrName>
@@ -7972,7 +7693,7 @@
                                       <p:cBhvr>
                                         <p:cTn id="76" dur="600"/>
                                         <p:tgtEl>
-                                          <p:spTgt spid="507"/>
+                                          <p:spTgt spid="500"/>
                                         </p:tgtEl>
                                       </p:cBhvr>
                                     </p:animEffect>
@@ -8001,7 +7722,7 @@
                                       <p:cBhvr>
                                         <p:cTn id="79" fill="hold"/>
                                         <p:tgtEl>
-                                          <p:spTgt spid="487"/>
+                                          <p:spTgt spid="480"/>
                                         </p:tgtEl>
                                         <p:attrNameLst>
                                           <p:attrName>style.visibility</p:attrName>
@@ -8015,7 +7736,7 @@
                                       <p:cBhvr>
                                         <p:cTn id="80" dur="600"/>
                                         <p:tgtEl>
-                                          <p:spTgt spid="487"/>
+                                          <p:spTgt spid="480"/>
                                         </p:tgtEl>
                                       </p:cBhvr>
                                     </p:animEffect>
@@ -8044,7 +7765,7 @@
                                       <p:cBhvr>
                                         <p:cTn id="83" fill="hold"/>
                                         <p:tgtEl>
-                                          <p:spTgt spid="524"/>
+                                          <p:spTgt spid="517"/>
                                         </p:tgtEl>
                                         <p:attrNameLst>
                                           <p:attrName>style.visibility</p:attrName>
@@ -8058,7 +7779,7 @@
                                       <p:cBhvr>
                                         <p:cTn id="84" dur="600" fill="hold"/>
                                         <p:tgtEl>
-                                          <p:spTgt spid="524"/>
+                                          <p:spTgt spid="517"/>
                                         </p:tgtEl>
                                         <p:attrNameLst>
                                           <p:attrName>ppt_w</p:attrName>
@@ -8081,7 +7802,7 @@
                                       <p:cBhvr>
                                         <p:cTn id="85" dur="600" fill="hold"/>
                                         <p:tgtEl>
-                                          <p:spTgt spid="524"/>
+                                          <p:spTgt spid="517"/>
                                         </p:tgtEl>
                                         <p:attrNameLst>
                                           <p:attrName>ppt_h</p:attrName>
@@ -8125,7 +7846,7 @@
                                       <p:cBhvr>
                                         <p:cTn id="88" fill="hold"/>
                                         <p:tgtEl>
-                                          <p:spTgt spid="509"/>
+                                          <p:spTgt spid="502"/>
                                         </p:tgtEl>
                                         <p:attrNameLst>
                                           <p:attrName>style.visibility</p:attrName>
@@ -8139,7 +7860,7 @@
                                       <p:cBhvr>
                                         <p:cTn id="89" dur="600"/>
                                         <p:tgtEl>
-                                          <p:spTgt spid="509"/>
+                                          <p:spTgt spid="502"/>
                                         </p:tgtEl>
                                       </p:cBhvr>
                                     </p:animEffect>
@@ -8168,7 +7889,7 @@
                                       <p:cBhvr>
                                         <p:cTn id="92" fill="hold"/>
                                         <p:tgtEl>
-                                          <p:spTgt spid="494"/>
+                                          <p:spTgt spid="487"/>
                                         </p:tgtEl>
                                         <p:attrNameLst>
                                           <p:attrName>style.visibility</p:attrName>
@@ -8182,7 +7903,7 @@
                                       <p:cBhvr>
                                         <p:cTn id="93" dur="1000" fill="hold"/>
                                         <p:tgtEl>
-                                          <p:spTgt spid="494"/>
+                                          <p:spTgt spid="487"/>
                                         </p:tgtEl>
                                         <p:attrNameLst>
                                           <p:attrName>ppt_x</p:attrName>
@@ -8205,7 +7926,7 @@
                                       <p:cBhvr>
                                         <p:cTn id="94" dur="1000" fill="hold"/>
                                         <p:tgtEl>
-                                          <p:spTgt spid="494"/>
+                                          <p:spTgt spid="487"/>
                                         </p:tgtEl>
                                         <p:attrNameLst>
                                           <p:attrName>ppt_y</p:attrName>
@@ -8249,7 +7970,7 @@
                                       <p:cBhvr>
                                         <p:cTn id="97" fill="hold"/>
                                         <p:tgtEl>
-                                          <p:spTgt spid="526"/>
+                                          <p:spTgt spid="519"/>
                                         </p:tgtEl>
                                         <p:attrNameLst>
                                           <p:attrName>style.visibility</p:attrName>
@@ -8263,7 +7984,7 @@
                                       <p:cBhvr>
                                         <p:cTn id="98" dur="600"/>
                                         <p:tgtEl>
-                                          <p:spTgt spid="526"/>
+                                          <p:spTgt spid="519"/>
                                         </p:tgtEl>
                                       </p:cBhvr>
                                     </p:animEffect>
@@ -8301,7 +8022,7 @@
                                       <p:cBhvr>
                                         <p:cTn id="102" fill="hold"/>
                                         <p:tgtEl>
-                                          <p:spTgt spid="529"/>
+                                          <p:spTgt spid="522"/>
                                         </p:tgtEl>
                                         <p:attrNameLst>
                                           <p:attrName>style.visibility</p:attrName>
@@ -8315,7 +8036,7 @@
                                       <p:cBhvr>
                                         <p:cTn id="103" dur="600"/>
                                         <p:tgtEl>
-                                          <p:spTgt spid="529"/>
+                                          <p:spTgt spid="522"/>
                                         </p:tgtEl>
                                       </p:cBhvr>
                                     </p:animEffect>
@@ -8344,7 +8065,7 @@
                                       <p:cBhvr>
                                         <p:cTn id="106" fill="hold"/>
                                         <p:tgtEl>
-                                          <p:spTgt spid="527"/>
+                                          <p:spTgt spid="520"/>
                                         </p:tgtEl>
                                         <p:attrNameLst>
                                           <p:attrName>style.visibility</p:attrName>
@@ -8358,7 +8079,7 @@
                                       <p:cBhvr>
                                         <p:cTn id="107" dur="600"/>
                                         <p:tgtEl>
-                                          <p:spTgt spid="527"/>
+                                          <p:spTgt spid="520"/>
                                         </p:tgtEl>
                                       </p:cBhvr>
                                     </p:animEffect>
@@ -8387,7 +8108,7 @@
                                       <p:cBhvr>
                                         <p:cTn id="110" fill="hold"/>
                                         <p:tgtEl>
-                                          <p:spTgt spid="515"/>
+                                          <p:spTgt spid="508"/>
                                         </p:tgtEl>
                                         <p:attrNameLst>
                                           <p:attrName>style.visibility</p:attrName>
@@ -8401,7 +8122,7 @@
                                       <p:cBhvr>
                                         <p:cTn id="111" dur="1000"/>
                                         <p:tgtEl>
-                                          <p:spTgt spid="515"/>
+                                          <p:spTgt spid="508"/>
                                         </p:tgtEl>
                                       </p:cBhvr>
                                     </p:animEffect>
@@ -8430,7 +8151,7 @@
                                       <p:cBhvr>
                                         <p:cTn id="114" fill="hold"/>
                                         <p:tgtEl>
-                                          <p:spTgt spid="518"/>
+                                          <p:spTgt spid="511"/>
                                         </p:tgtEl>
                                         <p:attrNameLst>
                                           <p:attrName>style.visibility</p:attrName>
@@ -8444,7 +8165,7 @@
                                       <p:cBhvr>
                                         <p:cTn id="115" dur="1000"/>
                                         <p:tgtEl>
-                                          <p:spTgt spid="518"/>
+                                          <p:spTgt spid="511"/>
                                         </p:tgtEl>
                                       </p:cBhvr>
                                     </p:animEffect>
@@ -8479,38 +8200,38 @@
       </p:par>
     </p:tnLst>
     <p:bldLst>
-      <p:bldP build="whole" bldLvl="1" animBg="1" rev="0" advAuto="0" spid="523" grpId="14"/>
-      <p:bldP build="whole" bldLvl="1" animBg="1" rev="0" advAuto="0" spid="497" grpId="9"/>
-      <p:bldP build="whole" bldLvl="1" animBg="1" rev="0" advAuto="0" spid="490" grpId="13"/>
-      <p:bldP build="whole" bldLvl="1" animBg="1" rev="0" advAuto="0" spid="515" grpId="25"/>
-      <p:bldP build="whole" bldLvl="1" animBg="1" rev="0" advAuto="0" spid="524" grpId="19"/>
-      <p:bldP build="whole" bldLvl="1" animBg="1" rev="0" advAuto="0" spid="487" grpId="18"/>
-      <p:bldP build="whole" bldLvl="1" animBg="1" rev="0" advAuto="0" spid="522" grpId="11"/>
-      <p:bldP build="whole" bldLvl="1" animBg="1" rev="0" advAuto="0" spid="494" grpId="21"/>
-      <p:bldP build="whole" bldLvl="1" animBg="1" rev="0" advAuto="0" spid="529" grpId="23"/>
-      <p:bldP build="whole" bldLvl="1" animBg="1" rev="0" advAuto="0" spid="499" grpId="6"/>
-      <p:bldP build="whole" bldLvl="1" animBg="1" rev="0" advAuto="0" spid="488" grpId="10"/>
-      <p:bldP build="whole" bldLvl="1" animBg="1" rev="0" advAuto="0" spid="518" grpId="27"/>
-      <p:bldP build="whole" bldLvl="1" animBg="1" rev="0" advAuto="0" spid="507" grpId="17"/>
-      <p:bldP build="whole" bldLvl="1" animBg="1" rev="0" advAuto="0" spid="509" grpId="20"/>
-      <p:bldP build="whole" bldLvl="1" animBg="1" rev="0" advAuto="0" spid="526" grpId="22"/>
-      <p:bldP build="whole" bldLvl="1" animBg="1" rev="0" advAuto="0" spid="521" grpId="8"/>
-      <p:bldP build="whole" bldLvl="1" animBg="1" rev="0" advAuto="0" spid="520" grpId="2"/>
-      <p:bldP build="whole" bldLvl="1" animBg="1" rev="0" advAuto="0" spid="505" grpId="15"/>
-      <p:bldP build="whole" bldLvl="1" animBg="1" rev="0" advAuto="0" spid="503" grpId="16"/>
-      <p:bldP build="whole" bldLvl="1" animBg="1" rev="0" advAuto="0" spid="486" grpId="4"/>
-      <p:bldP build="whole" bldLvl="1" animBg="1" rev="0" advAuto="0" spid="495" grpId="3"/>
-      <p:bldP build="whole" bldLvl="1" animBg="1" rev="0" advAuto="0" spid="519" grpId="5"/>
-      <p:bldP build="whole" bldLvl="1" animBg="1" rev="0" advAuto="0" spid="527" grpId="24"/>
-      <p:bldP build="whole" bldLvl="1" animBg="1" rev="0" advAuto="0" spid="489" grpId="7"/>
-      <p:bldP build="whole" bldLvl="1" animBg="1" rev="0" advAuto="0" spid="501" grpId="12"/>
-      <p:bldP build="whole" bldLvl="1" animBg="1" rev="0" advAuto="0" spid="485" grpId="1"/>
+      <p:bldP build="whole" bldLvl="1" animBg="1" rev="0" advAuto="0" spid="517" grpId="19"/>
+      <p:bldP build="whole" bldLvl="1" animBg="1" rev="0" advAuto="0" spid="488" grpId="3"/>
+      <p:bldP build="whole" bldLvl="1" animBg="1" rev="0" advAuto="0" spid="490" grpId="9"/>
+      <p:bldP build="whole" bldLvl="1" animBg="1" rev="0" advAuto="0" spid="478" grpId="1"/>
+      <p:bldP build="whole" bldLvl="1" animBg="1" rev="0" advAuto="0" spid="494" grpId="12"/>
+      <p:bldP build="whole" bldLvl="1" animBg="1" rev="0" advAuto="0" spid="482" grpId="7"/>
+      <p:bldP build="whole" bldLvl="1" animBg="1" rev="0" advAuto="0" spid="479" grpId="4"/>
+      <p:bldP build="whole" bldLvl="1" animBg="1" rev="0" advAuto="0" spid="483" grpId="13"/>
+      <p:bldP build="whole" bldLvl="1" animBg="1" rev="0" advAuto="0" spid="522" grpId="23"/>
+      <p:bldP build="whole" bldLvl="1" animBg="1" rev="0" advAuto="0" spid="508" grpId="25"/>
+      <p:bldP build="whole" bldLvl="1" animBg="1" rev="0" advAuto="0" spid="496" grpId="16"/>
+      <p:bldP build="whole" bldLvl="1" animBg="1" rev="0" advAuto="0" spid="487" grpId="21"/>
+      <p:bldP build="whole" bldLvl="1" animBg="1" rev="0" advAuto="0" spid="513" grpId="2"/>
+      <p:bldP build="whole" bldLvl="1" animBg="1" rev="0" advAuto="0" spid="480" grpId="18"/>
+      <p:bldP build="whole" bldLvl="1" animBg="1" rev="0" advAuto="0" spid="514" grpId="8"/>
+      <p:bldP build="whole" bldLvl="1" animBg="1" rev="0" advAuto="0" spid="515" grpId="11"/>
+      <p:bldP build="whole" bldLvl="1" animBg="1" rev="0" advAuto="0" spid="516" grpId="14"/>
+      <p:bldP build="whole" bldLvl="1" animBg="1" rev="0" advAuto="0" spid="481" grpId="10"/>
+      <p:bldP build="whole" bldLvl="1" animBg="1" rev="0" advAuto="0" spid="512" grpId="5"/>
+      <p:bldP build="whole" bldLvl="1" animBg="1" rev="0" advAuto="0" spid="502" grpId="20"/>
+      <p:bldP build="whole" bldLvl="1" animBg="1" rev="0" advAuto="0" spid="498" grpId="15"/>
+      <p:bldP build="whole" bldLvl="1" animBg="1" rev="0" advAuto="0" spid="511" grpId="27"/>
+      <p:bldP build="whole" bldLvl="1" animBg="1" rev="0" advAuto="0" spid="500" grpId="17"/>
+      <p:bldP build="whole" bldLvl="1" animBg="1" rev="0" advAuto="0" spid="492" grpId="6"/>
+      <p:bldP build="whole" bldLvl="1" animBg="1" rev="0" advAuto="0" spid="520" grpId="24"/>
+      <p:bldP build="whole" bldLvl="1" animBg="1" rev="0" advAuto="0" spid="519" grpId="22"/>
     </p:bldLst>
   </p:timing>
 </p:sld>
 </file>
 
-<file path=ppt/slides/slide12.xml><?xml version="1.0" encoding="utf-8"?>
+<file path=ppt/slides/slide11.xml><?xml version="1.0" encoding="utf-8"?>
 <p:sld xmlns:a="http://schemas.openxmlformats.org/drawingml/2006/main" xmlns:r="http://schemas.openxmlformats.org/officeDocument/2006/relationships" xmlns:p="http://schemas.openxmlformats.org/presentationml/2006/main" xmlns:m="http://schemas.openxmlformats.org/officeDocument/2006/math" xmlns:a14="http://schemas.microsoft.com/office/drawing/2010/main" showMasterSp="1" showMasterPhAnim="1">
   <p:cSld>
     <p:bg>
@@ -8536,7 +8257,7 @@
       </p:grpSpPr>
       <p:sp>
         <p:nvSpPr>
-          <p:cNvPr id="532" name="Title 6"/>
+          <p:cNvPr id="525" name="Title 6"/>
           <p:cNvSpPr txBox="1"/>
           <p:nvPr>
             <p:ph type="title"/>
@@ -8572,7 +8293,7 @@
       </p:sp>
       <p:grpSp>
         <p:nvGrpSpPr>
-          <p:cNvPr id="536" name="Group"/>
+          <p:cNvPr id="529" name="Group"/>
           <p:cNvGrpSpPr/>
           <p:nvPr/>
         </p:nvGrpSpPr>
@@ -8586,7 +8307,7 @@
         </p:grpSpPr>
         <p:sp>
           <p:nvSpPr>
-            <p:cNvPr id="533" name="Rectangle"/>
+            <p:cNvPr id="526" name="Rectangle"/>
             <p:cNvSpPr/>
             <p:nvPr/>
           </p:nvSpPr>
@@ -8635,7 +8356,7 @@
         </p:sp>
         <p:sp>
           <p:nvSpPr>
-            <p:cNvPr id="534" name="go get"/>
+            <p:cNvPr id="527" name="go get"/>
             <p:cNvSpPr txBox="1"/>
             <p:nvPr/>
           </p:nvSpPr>
@@ -8686,7 +8407,7 @@
         </p:sp>
         <p:sp>
           <p:nvSpPr>
-            <p:cNvPr id="535" name="Rectangle"/>
+            <p:cNvPr id="528" name="Rectangle"/>
             <p:cNvSpPr/>
             <p:nvPr/>
           </p:nvSpPr>
@@ -8736,7 +8457,7 @@
       </p:grpSp>
       <p:grpSp>
         <p:nvGrpSpPr>
-          <p:cNvPr id="539" name="Group"/>
+          <p:cNvPr id="532" name="Group"/>
           <p:cNvGrpSpPr/>
           <p:nvPr/>
         </p:nvGrpSpPr>
@@ -8750,7 +8471,7 @@
         </p:grpSpPr>
         <p:sp>
           <p:nvSpPr>
-            <p:cNvPr id="537" name="Rectangle"/>
+            <p:cNvPr id="530" name="Rectangle"/>
             <p:cNvSpPr/>
             <p:nvPr/>
           </p:nvSpPr>
@@ -8799,7 +8520,7 @@
         </p:sp>
         <p:sp>
           <p:nvSpPr>
-            <p:cNvPr id="538" name="$GOPATH"/>
+            <p:cNvPr id="531" name="$GOPATH"/>
             <p:cNvSpPr/>
             <p:nvPr/>
           </p:nvSpPr>
@@ -8851,7 +8572,7 @@
       </p:grpSp>
       <p:grpSp>
         <p:nvGrpSpPr>
-          <p:cNvPr id="542" name="Group"/>
+          <p:cNvPr id="535" name="Group"/>
           <p:cNvGrpSpPr/>
           <p:nvPr/>
         </p:nvGrpSpPr>
@@ -8865,7 +8586,7 @@
         </p:grpSpPr>
         <p:sp>
           <p:nvSpPr>
-            <p:cNvPr id="540" name="Rectangle"/>
+            <p:cNvPr id="533" name="Rectangle"/>
             <p:cNvSpPr/>
             <p:nvPr/>
           </p:nvSpPr>
@@ -8914,7 +8635,7 @@
         </p:sp>
         <p:sp>
           <p:nvSpPr>
-            <p:cNvPr id="541" name="vendor"/>
+            <p:cNvPr id="534" name="vendor"/>
             <p:cNvSpPr/>
             <p:nvPr/>
           </p:nvSpPr>
@@ -8966,7 +8687,7 @@
       </p:grpSp>
       <p:pic>
         <p:nvPicPr>
-          <p:cNvPr id="543" name="refresh-left-arrow.png" descr="refresh-left-arrow.png"/>
+          <p:cNvPr id="536" name="refresh-left-arrow.png" descr="refresh-left-arrow.png"/>
           <p:cNvPicPr>
             <a:picLocks noChangeAspect="1"/>
           </p:cNvPicPr>
@@ -8995,7 +8716,7 @@
       </p:pic>
       <p:pic>
         <p:nvPicPr>
-          <p:cNvPr id="544" name="cubes.png" descr="cubes.png"/>
+          <p:cNvPr id="537" name="cubes.png" descr="cubes.png"/>
           <p:cNvPicPr>
             <a:picLocks noChangeAspect="1"/>
           </p:cNvPicPr>
@@ -9075,7 +8796,7 @@
                                       <p:cBhvr>
                                         <p:cTn id="6" fill="hold"/>
                                         <p:tgtEl>
-                                          <p:spTgt spid="539"/>
+                                          <p:spTgt spid="532"/>
                                         </p:tgtEl>
                                         <p:attrNameLst>
                                           <p:attrName>style.visibility</p:attrName>
@@ -9089,7 +8810,7 @@
                                       <p:cBhvr>
                                         <p:cTn id="7" dur="600"/>
                                         <p:tgtEl>
-                                          <p:spTgt spid="539"/>
+                                          <p:spTgt spid="532"/>
                                         </p:tgtEl>
                                       </p:cBhvr>
                                     </p:animEffect>
@@ -9118,7 +8839,7 @@
                                       <p:cBhvr>
                                         <p:cTn id="10" fill="hold"/>
                                         <p:tgtEl>
-                                          <p:spTgt spid="542"/>
+                                          <p:spTgt spid="535"/>
                                         </p:tgtEl>
                                         <p:attrNameLst>
                                           <p:attrName>style.visibility</p:attrName>
@@ -9132,7 +8853,7 @@
                                       <p:cBhvr>
                                         <p:cTn id="11" dur="600"/>
                                         <p:tgtEl>
-                                          <p:spTgt spid="542"/>
+                                          <p:spTgt spid="535"/>
                                         </p:tgtEl>
                                       </p:cBhvr>
                                     </p:animEffect>
@@ -9161,7 +8882,7 @@
                                       <p:cBhvr>
                                         <p:cTn id="14" fill="hold"/>
                                         <p:tgtEl>
-                                          <p:spTgt spid="536"/>
+                                          <p:spTgt spid="529"/>
                                         </p:tgtEl>
                                         <p:attrNameLst>
                                           <p:attrName>style.visibility</p:attrName>
@@ -9175,7 +8896,7 @@
                                       <p:cBhvr>
                                         <p:cTn id="15" dur="600"/>
                                         <p:tgtEl>
-                                          <p:spTgt spid="536"/>
+                                          <p:spTgt spid="529"/>
                                         </p:tgtEl>
                                       </p:cBhvr>
                                     </p:animEffect>
@@ -9204,7 +8925,7 @@
                                       <p:cBhvr>
                                         <p:cTn id="18" fill="hold"/>
                                         <p:tgtEl>
-                                          <p:spTgt spid="543"/>
+                                          <p:spTgt spid="536"/>
                                         </p:tgtEl>
                                         <p:attrNameLst>
                                           <p:attrName>style.visibility</p:attrName>
@@ -9218,7 +8939,7 @@
                                       <p:cBhvr>
                                         <p:cTn id="19" dur="1000" fill="hold"/>
                                         <p:tgtEl>
-                                          <p:spTgt spid="543"/>
+                                          <p:spTgt spid="536"/>
                                         </p:tgtEl>
                                         <p:attrNameLst>
                                           <p:attrName>ppt_w</p:attrName>
@@ -9241,7 +8962,7 @@
                                       <p:cBhvr>
                                         <p:cTn id="20" dur="1000" fill="hold"/>
                                         <p:tgtEl>
-                                          <p:spTgt spid="543"/>
+                                          <p:spTgt spid="536"/>
                                         </p:tgtEl>
                                         <p:attrNameLst>
                                           <p:attrName>ppt_h</p:attrName>
@@ -9264,7 +8985,7 @@
                                       <p:cBhvr>
                                         <p:cTn id="21" dur="1000" fill="hold"/>
                                         <p:tgtEl>
-                                          <p:spTgt spid="543"/>
+                                          <p:spTgt spid="536"/>
                                         </p:tgtEl>
                                         <p:attrNameLst>
                                           <p:attrName>ppt_x</p:attrName>
@@ -9287,7 +9008,7 @@
                                       <p:cBhvr>
                                         <p:cTn id="22" dur="1000" fill="hold"/>
                                         <p:tgtEl>
-                                          <p:spTgt spid="543"/>
+                                          <p:spTgt spid="536"/>
                                         </p:tgtEl>
                                         <p:attrNameLst>
                                           <p:attrName>ppt_y</p:attrName>
@@ -9328,7 +9049,7 @@
                                       <p:cBhvr>
                                         <p:cTn id="25" dur="indefinite" fill="hold"/>
                                         <p:tgtEl>
-                                          <p:spTgt spid="542"/>
+                                          <p:spTgt spid="535"/>
                                         </p:tgtEl>
                                         <p:attrNameLst>
                                           <p:attrName>style.opacity</p:attrName>
@@ -9342,7 +9063,7 @@
                                       <p:cBhvr>
                                         <p:cTn id="26" dur="indefinite" fill="hold"/>
                                         <p:tgtEl>
-                                          <p:spTgt spid="542"/>
+                                          <p:spTgt spid="535"/>
                                         </p:tgtEl>
                                       </p:cBhvr>
                                     </p:animEffect>
@@ -9377,11 +9098,11 @@
       </p:par>
     </p:tnLst>
     <p:bldLst>
-      <p:bldP build="whole" bldLvl="1" animBg="1" rev="0" advAuto="0" spid="542" grpId="2"/>
-      <p:bldP build="whole" bldLvl="1" animBg="1" rev="0" advAuto="0" spid="536" grpId="3"/>
-      <p:bldP build="whole" bldLvl="1" animBg="1" rev="0" advAuto="0" spid="539" grpId="1"/>
-      <p:bldP build="whole" bldLvl="1" animBg="1" rev="0" advAuto="0" spid="543" grpId="5"/>
-      <p:bldP build="whole" bldLvl="1" animBg="1" rev="0" advAuto="0" spid="542" grpId="7"/>
+      <p:bldP build="whole" bldLvl="1" animBg="1" rev="0" advAuto="0" spid="535" grpId="7"/>
+      <p:bldP build="whole" bldLvl="1" animBg="1" rev="0" advAuto="0" spid="532" grpId="1"/>
+      <p:bldP build="whole" bldLvl="1" animBg="1" rev="0" advAuto="0" spid="535" grpId="2"/>
+      <p:bldP build="whole" bldLvl="1" animBg="1" rev="0" advAuto="0" spid="529" grpId="3"/>
+      <p:bldP build="whole" bldLvl="1" animBg="1" rev="0" advAuto="0" spid="536" grpId="5"/>
     </p:bldLst>
   </p:timing>
 </p:sld>
@@ -11306,7 +11027,7 @@
         </p:nvSpPr>
         <p:spPr>
           <a:xfrm>
-            <a:off x="16094342" y="12681644"/>
+            <a:off x="16094341" y="12681644"/>
             <a:ext cx="1257936" cy="625476"/>
           </a:xfrm>
           <a:prstGeom prst="rect">
@@ -11355,7 +11076,7 @@
         <p:spPr>
           <a:xfrm>
             <a:off x="11766257" y="3903920"/>
-            <a:ext cx="851486" cy="625476"/>
+            <a:ext cx="851485" cy="625476"/>
           </a:xfrm>
           <a:prstGeom prst="rect">
             <a:avLst/>
@@ -13104,38 +12825,38 @@
       </p:par>
     </p:tnLst>
     <p:bldLst>
+      <p:bldP build="whole" bldLvl="1" animBg="1" rev="0" advAuto="0" spid="247" grpId="19"/>
+      <p:bldP build="whole" bldLvl="1" animBg="1" rev="0" advAuto="0" spid="194" grpId="8"/>
+      <p:bldP build="whole" bldLvl="1" animBg="1" rev="0" advAuto="0" spid="216" grpId="10"/>
+      <p:bldP build="whole" bldLvl="1" animBg="1" rev="0" advAuto="0" spid="226" grpId="12"/>
+      <p:bldP build="whole" bldLvl="1" animBg="1" rev="0" advAuto="0" spid="260" grpId="13"/>
+      <p:bldP build="whole" bldLvl="1" animBg="1" rev="0" advAuto="0" spid="258" grpId="14"/>
       <p:bldP build="whole" bldLvl="1" animBg="1" rev="0" advAuto="0" spid="223" grpId="9"/>
+      <p:bldP build="whole" bldLvl="1" animBg="1" rev="0" advAuto="0" spid="191" grpId="5"/>
+      <p:bldP build="whole" bldLvl="1" animBg="1" rev="0" advAuto="0" spid="186" grpId="18"/>
+      <p:bldP build="whole" bldLvl="1" animBg="1" rev="0" advAuto="0" spid="243" grpId="23"/>
+      <p:bldP build="whole" bldLvl="1" animBg="1" rev="0" advAuto="0" spid="239" grpId="16"/>
+      <p:bldP build="whole" bldLvl="1" animBg="1" rev="0" advAuto="0" spid="200" grpId="1"/>
+      <p:bldP build="whole" bldLvl="1" animBg="1" rev="0" advAuto="0" spid="210" grpId="17"/>
+      <p:bldP build="whole" bldLvl="1" animBg="1" rev="0" advAuto="0" spid="197" grpId="11"/>
+      <p:bldP build="whole" bldLvl="1" animBg="1" rev="0" advAuto="0" spid="213" grpId="7"/>
+      <p:bldP build="whole" bldLvl="1" animBg="1" rev="0" advAuto="0" spid="241" grpId="21"/>
+      <p:bldP build="whole" bldLvl="1" animBg="1" rev="0" advAuto="0" spid="206" grpId="22"/>
+      <p:bldP build="whole" bldLvl="1" animBg="1" rev="0" advAuto="0" spid="252" grpId="26"/>
+      <p:bldP build="whole" bldLvl="1" animBg="1" rev="0" advAuto="0" spid="187" grpId="2"/>
+      <p:bldP build="whole" bldLvl="1" animBg="1" rev="0" advAuto="0" spid="188" grpId="31"/>
+      <p:bldP build="whole" bldLvl="1" animBg="1" rev="0" advAuto="0" spid="254" grpId="27"/>
       <p:bldP build="whole" bldLvl="1" animBg="1" rev="0" advAuto="0" spid="246" grpId="32"/>
-      <p:bldP build="whole" bldLvl="1" animBg="1" rev="0" advAuto="0" spid="258" grpId="14"/>
-      <p:bldP build="whole" bldLvl="1" animBg="1" rev="0" advAuto="0" spid="197" grpId="11"/>
-      <p:bldP build="whole" bldLvl="1" animBg="1" rev="0" advAuto="0" spid="206" grpId="22"/>
-      <p:bldP build="whole" bldLvl="1" animBg="1" rev="0" advAuto="0" spid="200" grpId="1"/>
+      <p:bldP build="whole" bldLvl="1" animBg="1" rev="0" advAuto="0" spid="220" grpId="29"/>
+      <p:bldP build="whole" bldLvl="1" animBg="1" rev="0" advAuto="0" spid="221" grpId="6"/>
       <p:bldP build="whole" bldLvl="1" animBg="1" rev="0" advAuto="0" spid="245" grpId="3"/>
-      <p:bldP build="whole" bldLvl="1" animBg="1" rev="0" advAuto="0" spid="187" grpId="2"/>
-      <p:bldP build="whole" bldLvl="1" animBg="1" rev="0" advAuto="0" spid="243" grpId="23"/>
-      <p:bldP build="whole" bldLvl="1" animBg="1" rev="0" advAuto="0" spid="254" grpId="27"/>
-      <p:bldP build="whole" bldLvl="1" animBg="1" rev="0" advAuto="0" spid="221" grpId="6"/>
-      <p:bldP build="whole" bldLvl="1" animBg="1" rev="0" advAuto="0" spid="239" grpId="16"/>
+      <p:bldP build="whole" bldLvl="1" animBg="1" rev="0" advAuto="0" spid="203" grpId="20"/>
+      <p:bldP build="whole" bldLvl="1" animBg="1" rev="0" advAuto="0" spid="237" grpId="30"/>
+      <p:bldP build="whole" bldLvl="1" animBg="1" rev="0" advAuto="0" spid="256" grpId="15"/>
       <p:bldP build="whole" bldLvl="1" animBg="1" rev="0" advAuto="0" spid="225" grpId="4"/>
-      <p:bldP build="whole" bldLvl="1" animBg="1" rev="0" advAuto="0" spid="237" grpId="30"/>
-      <p:bldP build="whole" bldLvl="1" animBg="1" rev="0" advAuto="0" spid="220" grpId="29"/>
-      <p:bldP build="whole" bldLvl="1" animBg="1" rev="0" advAuto="0" spid="188" grpId="31"/>
-      <p:bldP build="whole" bldLvl="1" animBg="1" rev="0" advAuto="0" spid="260" grpId="13"/>
-      <p:bldP build="whole" bldLvl="1" animBg="1" rev="0" advAuto="0" spid="256" grpId="15"/>
-      <p:bldP build="whole" bldLvl="1" animBg="1" rev="0" advAuto="0" spid="247" grpId="19"/>
+      <p:bldP build="whole" bldLvl="1" animBg="1" rev="0" advAuto="0" spid="248" grpId="24"/>
       <p:bldP build="whole" bldLvl="1" animBg="1" rev="0" advAuto="0" spid="250" grpId="25"/>
-      <p:bldP build="whole" bldLvl="1" animBg="1" rev="0" advAuto="0" spid="252" grpId="26"/>
-      <p:bldP build="whole" bldLvl="1" animBg="1" rev="0" advAuto="0" spid="186" grpId="18"/>
-      <p:bldP build="whole" bldLvl="1" animBg="1" rev="0" advAuto="0" spid="216" grpId="10"/>
-      <p:bldP build="whole" bldLvl="1" animBg="1" rev="0" advAuto="0" spid="248" grpId="24"/>
-      <p:bldP build="whole" bldLvl="1" animBg="1" rev="0" advAuto="0" spid="226" grpId="12"/>
       <p:bldP build="whole" bldLvl="1" animBg="1" rev="0" advAuto="0" spid="235" grpId="28"/>
-      <p:bldP build="whole" bldLvl="1" animBg="1" rev="0" advAuto="0" spid="194" grpId="8"/>
-      <p:bldP build="whole" bldLvl="1" animBg="1" rev="0" advAuto="0" spid="191" grpId="5"/>
-      <p:bldP build="whole" bldLvl="1" animBg="1" rev="0" advAuto="0" spid="210" grpId="17"/>
-      <p:bldP build="whole" bldLvl="1" animBg="1" rev="0" advAuto="0" spid="203" grpId="20"/>
-      <p:bldP build="whole" bldLvl="1" animBg="1" rev="0" advAuto="0" spid="241" grpId="21"/>
-      <p:bldP build="whole" bldLvl="1" animBg="1" rev="0" advAuto="0" spid="213" grpId="7"/>
     </p:bldLst>
   </p:timing>
 </p:sld>
@@ -14458,7 +14179,7 @@
         <p:spPr>
           <a:xfrm>
             <a:off x="11013322" y="6016075"/>
-            <a:ext cx="3538049" cy="3538050"/>
+            <a:ext cx="3538050" cy="3538050"/>
           </a:xfrm>
           <a:prstGeom prst="rect">
             <a:avLst/>
@@ -15584,23 +15305,23 @@
       </p:par>
     </p:tnLst>
     <p:bldLst>
-      <p:bldP build="whole" bldLvl="1" animBg="1" rev="0" advAuto="0" spid="297" grpId="15"/>
       <p:bldP build="whole" bldLvl="1" animBg="1" rev="0" advAuto="0" spid="298" grpId="16"/>
+      <p:bldP build="whole" bldLvl="1" animBg="1" rev="0" advAuto="0" spid="298" grpId="17"/>
+      <p:bldP build="whole" bldLvl="1" animBg="1" rev="0" advAuto="0" spid="294" grpId="4"/>
+      <p:bldP build="whole" bldLvl="1" animBg="1" rev="0" advAuto="0" spid="275" grpId="5"/>
+      <p:bldP build="whole" bldLvl="1" animBg="1" rev="0" advAuto="0" spid="276" grpId="6"/>
+      <p:bldP build="whole" bldLvl="1" animBg="1" rev="0" advAuto="0" spid="290" grpId="12"/>
+      <p:bldP build="whole" bldLvl="1" animBg="1" rev="0" advAuto="0" spid="266" grpId="1"/>
+      <p:bldP build="whole" bldLvl="1" animBg="1" rev="0" advAuto="0" spid="291" grpId="13"/>
+      <p:bldP build="whole" bldLvl="1" animBg="1" rev="0" advAuto="0" spid="295" grpId="11"/>
+      <p:bldP build="whole" bldLvl="1" animBg="1" rev="0" advAuto="0" spid="281" grpId="8"/>
+      <p:bldP build="whole" bldLvl="1" animBg="1" rev="0" advAuto="0" spid="269" grpId="2"/>
+      <p:bldP build="whole" bldLvl="1" animBg="1" rev="0" advAuto="0" spid="278" grpId="7"/>
+      <p:bldP build="whole" bldLvl="1" animBg="1" rev="0" advAuto="0" spid="293" grpId="14"/>
       <p:bldP build="whole" bldLvl="1" animBg="1" rev="0" advAuto="0" spid="284" grpId="9"/>
-      <p:bldP build="whole" bldLvl="1" animBg="1" rev="0" advAuto="0" spid="298" grpId="17"/>
-      <p:bldP build="whole" bldLvl="1" animBg="1" rev="0" advAuto="0" spid="276" grpId="6"/>
-      <p:bldP build="whole" bldLvl="1" animBg="1" rev="0" advAuto="0" spid="278" grpId="7"/>
-      <p:bldP build="whole" bldLvl="1" animBg="1" rev="0" advAuto="0" spid="266" grpId="1"/>
-      <p:bldP build="whole" bldLvl="1" animBg="1" rev="0" advAuto="0" spid="281" grpId="8"/>
-      <p:bldP build="whole" bldLvl="1" animBg="1" rev="0" advAuto="0" spid="294" grpId="4"/>
-      <p:bldP build="whole" bldLvl="1" animBg="1" rev="0" advAuto="0" spid="269" grpId="2"/>
-      <p:bldP build="whole" bldLvl="1" animBg="1" rev="0" advAuto="0" spid="291" grpId="13"/>
       <p:bldP build="whole" bldLvl="1" animBg="1" rev="0" advAuto="0" spid="272" grpId="3"/>
       <p:bldP build="whole" bldLvl="1" animBg="1" rev="0" advAuto="0" spid="287" grpId="10"/>
-      <p:bldP build="whole" bldLvl="1" animBg="1" rev="0" advAuto="0" spid="293" grpId="14"/>
-      <p:bldP build="whole" bldLvl="1" animBg="1" rev="0" advAuto="0" spid="295" grpId="11"/>
-      <p:bldP build="whole" bldLvl="1" animBg="1" rev="0" advAuto="0" spid="275" grpId="5"/>
-      <p:bldP build="whole" bldLvl="1" animBg="1" rev="0" advAuto="0" spid="290" grpId="12"/>
+      <p:bldP build="whole" bldLvl="1" animBg="1" rev="0" advAuto="0" spid="297" grpId="15"/>
     </p:bldLst>
   </p:timing>
 </p:sld>
@@ -16896,13 +16617,13 @@
       </p:par>
     </p:tnLst>
     <p:bldLst>
-      <p:bldP build="whole" bldLvl="1" animBg="1" rev="0" advAuto="0" spid="312" grpId="9"/>
-      <p:bldP build="whole" bldLvl="1" animBg="1" rev="0" advAuto="0" spid="309" grpId="7"/>
+      <p:bldP build="whole" bldLvl="1" animBg="1" rev="0" advAuto="0" spid="303" grpId="1"/>
       <p:bldP build="whole" bldLvl="1" animBg="1" rev="0" advAuto="0" spid="315" grpId="4"/>
       <p:bldP build="whole" bldLvl="1" animBg="1" rev="0" advAuto="0" spid="313" grpId="3"/>
       <p:bldP build="whole" bldLvl="1" animBg="1" rev="0" advAuto="0" spid="306" grpId="5"/>
-      <p:bldP build="whole" bldLvl="1" animBg="1" rev="0" advAuto="0" spid="303" grpId="1"/>
       <p:bldP build="whole" bldLvl="1" animBg="1" rev="0" advAuto="0" spid="314" grpId="2"/>
+      <p:bldP build="whole" bldLvl="1" animBg="1" rev="0" advAuto="0" spid="309" grpId="7"/>
+      <p:bldP build="whole" bldLvl="1" animBg="1" rev="0" advAuto="0" spid="312" grpId="9"/>
     </p:bldLst>
   </p:timing>
 </p:sld>
@@ -16977,7 +16698,7 @@
         <p:grpSpPr>
           <a:xfrm>
             <a:off x="11859758" y="3727575"/>
-            <a:ext cx="10651993" cy="4276055"/>
+            <a:ext cx="10651992" cy="4276055"/>
             <a:chOff x="0" y="0"/>
             <a:chExt cx="10651991" cy="4276053"/>
           </a:xfrm>
@@ -17253,8 +16974,8 @@
         </p:nvGrpSpPr>
         <p:grpSpPr>
           <a:xfrm>
-            <a:off x="4288630" y="10858123"/>
-            <a:ext cx="2550634" cy="1764901"/>
+            <a:off x="4288631" y="10858124"/>
+            <a:ext cx="2550633" cy="1764900"/>
             <a:chOff x="0" y="0"/>
             <a:chExt cx="2550632" cy="1764899"/>
           </a:xfrm>
@@ -17368,8 +17089,8 @@
         </p:nvGrpSpPr>
         <p:grpSpPr>
           <a:xfrm>
-            <a:off x="3082130" y="8445308"/>
-            <a:ext cx="2550634" cy="1764901"/>
+            <a:off x="3082131" y="8445308"/>
+            <a:ext cx="2550633" cy="1764901"/>
             <a:chOff x="0" y="0"/>
             <a:chExt cx="2550632" cy="1764899"/>
           </a:xfrm>
@@ -17483,8 +17204,8 @@
         </p:nvGrpSpPr>
         <p:grpSpPr>
           <a:xfrm>
-            <a:off x="3082130" y="4923029"/>
-            <a:ext cx="2550634" cy="1764901"/>
+            <a:off x="3082131" y="4923030"/>
+            <a:ext cx="2550633" cy="1764900"/>
             <a:chOff x="0" y="0"/>
             <a:chExt cx="2550632" cy="1764899"/>
           </a:xfrm>
@@ -17598,8 +17319,8 @@
         </p:nvGrpSpPr>
         <p:grpSpPr>
           <a:xfrm>
-            <a:off x="3082130" y="6097123"/>
-            <a:ext cx="2550634" cy="1764900"/>
+            <a:off x="3082131" y="6097123"/>
+            <a:ext cx="2550633" cy="1764900"/>
             <a:chOff x="0" y="0"/>
             <a:chExt cx="2550632" cy="1764899"/>
           </a:xfrm>
@@ -17713,8 +17434,8 @@
         </p:nvGrpSpPr>
         <p:grpSpPr>
           <a:xfrm>
-            <a:off x="3082130" y="7271215"/>
-            <a:ext cx="2550634" cy="1764901"/>
+            <a:off x="3082131" y="7271215"/>
+            <a:ext cx="2550633" cy="1764901"/>
             <a:chOff x="0" y="0"/>
             <a:chExt cx="2550632" cy="1764899"/>
           </a:xfrm>
@@ -17982,7 +17703,7 @@
         </p:nvGrpSpPr>
         <p:grpSpPr>
           <a:xfrm>
-            <a:off x="1872249" y="3722276"/>
+            <a:off x="1872250" y="3722276"/>
             <a:ext cx="8936640" cy="1016461"/>
             <a:chOff x="0" y="0"/>
             <a:chExt cx="8936639" cy="1016460"/>
@@ -18146,7 +17867,7 @@
         </p:blipFill>
         <p:spPr>
           <a:xfrm rot="16200000">
-            <a:off x="-249603" y="7483033"/>
+            <a:off x="-249604" y="7483033"/>
             <a:ext cx="5221607" cy="101601"/>
           </a:xfrm>
           <a:prstGeom prst="rect">
@@ -18198,7 +17919,7 @@
         </p:blipFill>
         <p:spPr>
           <a:xfrm>
-            <a:off x="2297699" y="6541222"/>
+            <a:off x="2297700" y="6541223"/>
             <a:ext cx="694389" cy="101601"/>
           </a:xfrm>
           <a:prstGeom prst="rect">
@@ -18224,7 +17945,7 @@
         </p:blipFill>
         <p:spPr>
           <a:xfrm>
-            <a:off x="2297699" y="7715315"/>
+            <a:off x="2297700" y="7715315"/>
             <a:ext cx="694389" cy="101601"/>
           </a:xfrm>
           <a:prstGeom prst="rect">
@@ -18250,7 +17971,7 @@
         </p:blipFill>
         <p:spPr>
           <a:xfrm>
-            <a:off x="2297699" y="8959915"/>
+            <a:off x="2297700" y="8959915"/>
             <a:ext cx="694389" cy="101601"/>
           </a:xfrm>
           <a:prstGeom prst="rect">
@@ -18276,7 +17997,7 @@
         </p:blipFill>
         <p:spPr>
           <a:xfrm rot="16200000">
-            <a:off x="3233384" y="11077010"/>
+            <a:off x="3233384" y="11077009"/>
             <a:ext cx="668632" cy="101601"/>
           </a:xfrm>
           <a:prstGeom prst="rect">
@@ -18302,7 +18023,7 @@
         </p:blipFill>
         <p:spPr>
           <a:xfrm>
-            <a:off x="3504199" y="11320801"/>
+            <a:off x="3504200" y="11320802"/>
             <a:ext cx="694389" cy="101601"/>
           </a:xfrm>
           <a:prstGeom prst="rect">
@@ -19475,23 +19196,23 @@
       </p:par>
     </p:tnLst>
     <p:bldLst>
+      <p:bldP build="whole" bldLvl="1" animBg="1" rev="0" advAuto="0" spid="357" grpId="14"/>
+      <p:bldP build="whole" bldLvl="1" animBg="1" rev="0" advAuto="0" spid="349" grpId="5"/>
+      <p:bldP build="whole" bldLvl="1" animBg="1" rev="0" advAuto="0" spid="321" grpId="16"/>
+      <p:bldP build="whole" bldLvl="1" animBg="1" rev="0" advAuto="0" spid="336" grpId="8"/>
+      <p:bldP build="whole" bldLvl="1" animBg="1" rev="0" advAuto="0" spid="353" grpId="9"/>
+      <p:bldP build="whole" bldLvl="1" animBg="1" rev="0" advAuto="0" spid="344" grpId="1"/>
+      <p:bldP build="whole" bldLvl="1" animBg="1" rev="0" advAuto="0" spid="351" grpId="7"/>
+      <p:bldP build="whole" bldLvl="1" animBg="1" rev="0" advAuto="0" spid="345" grpId="2"/>
+      <p:bldP build="whole" bldLvl="1" animBg="1" rev="0" advAuto="0" spid="327" grpId="10"/>
+      <p:bldP build="whole" bldLvl="1" animBg="1" rev="0" advAuto="0" spid="330" grpId="4"/>
+      <p:bldP build="whole" bldLvl="1" animBg="1" rev="0" advAuto="0" spid="360" grpId="11"/>
+      <p:bldP build="whole" bldLvl="1" animBg="1" rev="0" advAuto="0" spid="355" grpId="13"/>
+      <p:bldP build="whole" bldLvl="1" animBg="1" rev="0" advAuto="0" spid="333" grpId="6"/>
+      <p:bldP build="whole" bldLvl="1" animBg="1" rev="0" advAuto="0" spid="324" grpId="15"/>
       <p:bldP build="whole" bldLvl="1" animBg="1" rev="0" advAuto="0" spid="340" grpId="12"/>
       <p:bldP build="whole" bldLvl="1" animBg="1" rev="0" advAuto="0" spid="347" grpId="3"/>
-      <p:bldP build="whole" bldLvl="1" animBg="1" rev="0" advAuto="0" spid="330" grpId="4"/>
-      <p:bldP build="whole" bldLvl="1" animBg="1" rev="0" advAuto="0" spid="336" grpId="8"/>
-      <p:bldP build="whole" bldLvl="1" animBg="1" rev="0" advAuto="0" spid="327" grpId="10"/>
-      <p:bldP build="whole" bldLvl="1" animBg="1" rev="0" advAuto="0" spid="353" grpId="9"/>
-      <p:bldP build="whole" bldLvl="1" animBg="1" rev="0" advAuto="0" spid="349" grpId="5"/>
-      <p:bldP build="whole" bldLvl="1" animBg="1" rev="0" advAuto="0" spid="355" grpId="13"/>
-      <p:bldP build="whole" bldLvl="1" animBg="1" rev="0" advAuto="0" spid="357" grpId="14"/>
-      <p:bldP build="whole" bldLvl="1" animBg="1" rev="0" advAuto="0" spid="345" grpId="2"/>
-      <p:bldP build="whole" bldLvl="1" animBg="1" rev="0" advAuto="0" spid="324" grpId="15"/>
-      <p:bldP build="whole" bldLvl="1" animBg="1" rev="0" advAuto="0" spid="321" grpId="16"/>
-      <p:bldP build="whole" bldLvl="1" animBg="1" rev="0" advAuto="0" spid="333" grpId="6"/>
       <p:bldP build="whole" bldLvl="1" animBg="1" rev="0" advAuto="0" spid="362" grpId="17"/>
-      <p:bldP build="whole" bldLvl="1" animBg="1" rev="0" advAuto="0" spid="360" grpId="11"/>
-      <p:bldP build="whole" bldLvl="1" animBg="1" rev="0" advAuto="0" spid="351" grpId="7"/>
-      <p:bldP build="whole" bldLvl="1" animBg="1" rev="0" advAuto="0" spid="344" grpId="1"/>
     </p:bldLst>
   </p:timing>
 </p:sld>
@@ -19817,7 +19538,7 @@
         </p:nvSpPr>
         <p:spPr>
           <a:xfrm>
-            <a:off x="5954482" y="6927992"/>
+            <a:off x="5954482" y="6927991"/>
             <a:ext cx="777876" cy="993776"/>
           </a:xfrm>
           <a:prstGeom prst="rect">
@@ -20159,7 +19880,7 @@
         </p:nvSpPr>
         <p:spPr>
           <a:xfrm>
-            <a:off x="5954482" y="8278160"/>
+            <a:off x="5954482" y="8278159"/>
             <a:ext cx="777876" cy="993776"/>
           </a:xfrm>
           <a:prstGeom prst="rect">
@@ -20354,7 +20075,7 @@
         </p:nvSpPr>
         <p:spPr>
           <a:xfrm>
-            <a:off x="5954482" y="9628328"/>
+            <a:off x="5954482" y="9628327"/>
             <a:ext cx="777876" cy="993776"/>
           </a:xfrm>
           <a:prstGeom prst="rect">
@@ -20550,7 +20271,7 @@
         <p:grpSpPr>
           <a:xfrm>
             <a:off x="4813300" y="11636511"/>
-            <a:ext cx="2933866" cy="989801"/>
+            <a:ext cx="2933866" cy="989800"/>
             <a:chOff x="0" y="0"/>
             <a:chExt cx="2933865" cy="989799"/>
           </a:xfrm>
@@ -20945,7 +20666,7 @@
         </p:blipFill>
         <p:spPr>
           <a:xfrm rot="16200000">
-            <a:off x="2555233" y="9113737"/>
+            <a:off x="2555233" y="9113738"/>
             <a:ext cx="898474" cy="101601"/>
           </a:xfrm>
           <a:prstGeom prst="rect">
@@ -20971,7 +20692,7 @@
         </p:blipFill>
         <p:spPr>
           <a:xfrm>
-            <a:off x="2940969" y="9500850"/>
+            <a:off x="2940969" y="9500851"/>
             <a:ext cx="694389" cy="101601"/>
           </a:xfrm>
           <a:prstGeom prst="rect">
@@ -20998,7 +20719,7 @@
         <p:spPr>
           <a:xfrm rot="16200000">
             <a:off x="3117751" y="11095792"/>
-            <a:ext cx="2159257" cy="101601"/>
+            <a:ext cx="2159256" cy="101601"/>
           </a:xfrm>
           <a:prstGeom prst="rect">
             <a:avLst/>
@@ -21023,7 +20744,7 @@
         </p:blipFill>
         <p:spPr>
           <a:xfrm>
-            <a:off x="4133879" y="10889376"/>
+            <a:off x="4133879" y="10889377"/>
             <a:ext cx="694389" cy="101601"/>
           </a:xfrm>
           <a:prstGeom prst="rect">
@@ -21245,7 +20966,7 @@
         </p:nvSpPr>
         <p:spPr>
           <a:xfrm>
-            <a:off x="8121538" y="6716966"/>
+            <a:off x="8121538" y="6716965"/>
             <a:ext cx="936250" cy="424468"/>
           </a:xfrm>
           <a:prstGeom prst="rect">
@@ -21335,8 +21056,8 @@
         </p:nvSpPr>
         <p:spPr>
           <a:xfrm>
-            <a:off x="10292525" y="9361557"/>
-            <a:ext cx="936250" cy="424467"/>
+            <a:off x="10292526" y="9361557"/>
+            <a:ext cx="936249" cy="424468"/>
           </a:xfrm>
           <a:prstGeom prst="rect">
             <a:avLst/>
@@ -21380,8 +21101,8 @@
         </p:nvSpPr>
         <p:spPr>
           <a:xfrm>
-            <a:off x="11460313" y="10742518"/>
-            <a:ext cx="936250" cy="424467"/>
+            <a:off x="11460313" y="10742517"/>
+            <a:ext cx="936250" cy="424468"/>
           </a:xfrm>
           <a:prstGeom prst="rect">
             <a:avLst/>
@@ -22878,32 +22599,32 @@
       </p:par>
     </p:tnLst>
     <p:bldLst>
+      <p:bldP build="whole" bldLvl="1" animBg="1" rev="0" advAuto="0" spid="370" grpId="1"/>
+      <p:bldP build="whole" bldLvl="1" animBg="1" rev="0" advAuto="0" spid="367" grpId="2"/>
+      <p:bldP build="whole" bldLvl="1" animBg="1" rev="0" advAuto="0" spid="407" grpId="13"/>
+      <p:bldP build="whole" bldLvl="1" animBg="1" rev="0" advAuto="0" spid="397" grpId="19"/>
+      <p:bldP build="whole" bldLvl="1" animBg="1" rev="0" advAuto="0" spid="420" grpId="24"/>
       <p:bldP build="whole" bldLvl="1" animBg="1" rev="0" advAuto="0" spid="399" grpId="5"/>
+      <p:bldP build="whole" bldLvl="1" animBg="1" rev="0" advAuto="0" spid="405" grpId="10"/>
+      <p:bldP build="whole" bldLvl="1" animBg="1" rev="0" advAuto="0" spid="401" grpId="6"/>
+      <p:bldP build="whole" bldLvl="1" animBg="1" rev="0" advAuto="0" spid="403" grpId="9"/>
+      <p:bldP build="whole" bldLvl="1" animBg="1" rev="0" advAuto="0" spid="419" grpId="25"/>
+      <p:bldP build="whole" bldLvl="1" animBg="1" rev="0" advAuto="0" spid="384" grpId="11"/>
+      <p:bldP build="whole" bldLvl="1" animBg="1" rev="0" advAuto="0" spid="371" grpId="4"/>
+      <p:bldP build="whole" bldLvl="1" animBg="1" rev="0" advAuto="0" spid="389" grpId="15"/>
+      <p:bldP build="whole" bldLvl="1" animBg="1" rev="0" advAuto="0" spid="418" grpId="26"/>
+      <p:bldP build="whole" bldLvl="1" animBg="1" rev="0" advAuto="0" spid="409" grpId="14"/>
+      <p:bldP build="whole" bldLvl="1" animBg="1" rev="0" advAuto="0" spid="385" grpId="12"/>
       <p:bldP build="whole" bldLvl="1" animBg="1" rev="0" advAuto="0" spid="379" grpId="7"/>
+      <p:bldP build="whole" bldLvl="1" animBg="1" rev="0" advAuto="0" spid="416" grpId="23"/>
+      <p:bldP build="whole" bldLvl="1" animBg="1" rev="0" advAuto="0" spid="417" grpId="27"/>
+      <p:bldP build="whole" bldLvl="1" animBg="1" rev="0" advAuto="0" spid="414" grpId="21"/>
+      <p:bldP build="whole" bldLvl="1" animBg="1" rev="0" advAuto="0" spid="393" grpId="17"/>
       <p:bldP build="whole" bldLvl="1" animBg="1" rev="0" advAuto="0" spid="413" grpId="20"/>
-      <p:bldP build="whole" bldLvl="1" animBg="1" rev="0" advAuto="0" spid="409" grpId="14"/>
-      <p:bldP build="whole" bldLvl="1" animBg="1" rev="0" advAuto="0" spid="371" grpId="4"/>
-      <p:bldP build="whole" bldLvl="1" animBg="1" rev="0" advAuto="0" spid="370" grpId="1"/>
-      <p:bldP build="whole" bldLvl="1" animBg="1" rev="0" advAuto="0" spid="417" grpId="27"/>
-      <p:bldP build="whole" bldLvl="1" animBg="1" rev="0" advAuto="0" spid="385" grpId="12"/>
-      <p:bldP build="whole" bldLvl="1" animBg="1" rev="0" advAuto="0" spid="367" grpId="2"/>
-      <p:bldP build="whole" bldLvl="1" animBg="1" rev="0" advAuto="0" spid="418" grpId="26"/>
-      <p:bldP build="whole" bldLvl="1" animBg="1" rev="0" advAuto="0" spid="393" grpId="17"/>
-      <p:bldP build="whole" bldLvl="1" animBg="1" rev="0" advAuto="0" spid="405" grpId="10"/>
-      <p:bldP build="whole" bldLvl="1" animBg="1" rev="0" advAuto="0" spid="403" grpId="9"/>
-      <p:bldP build="whole" bldLvl="1" animBg="1" rev="0" advAuto="0" spid="397" grpId="19"/>
+      <p:bldP build="whole" bldLvl="1" animBg="1" rev="0" advAuto="0" spid="375" grpId="3"/>
+      <p:bldP build="whole" bldLvl="1" animBg="1" rev="0" advAuto="0" spid="415" grpId="22"/>
       <p:bldP build="whole" bldLvl="1" animBg="1" rev="0" advAuto="0" spid="411" grpId="16"/>
-      <p:bldP build="whole" bldLvl="1" animBg="1" rev="0" advAuto="0" spid="401" grpId="6"/>
-      <p:bldP build="whole" bldLvl="1" animBg="1" rev="0" advAuto="0" spid="384" grpId="11"/>
       <p:bldP build="whole" bldLvl="1" animBg="1" rev="0" advAuto="0" spid="380" grpId="8"/>
-      <p:bldP build="whole" bldLvl="1" animBg="1" rev="0" advAuto="0" spid="419" grpId="25"/>
-      <p:bldP build="whole" bldLvl="1" animBg="1" rev="0" advAuto="0" spid="375" grpId="3"/>
-      <p:bldP build="whole" bldLvl="1" animBg="1" rev="0" advAuto="0" spid="389" grpId="15"/>
-      <p:bldP build="whole" bldLvl="1" animBg="1" rev="0" advAuto="0" spid="414" grpId="21"/>
-      <p:bldP build="whole" bldLvl="1" animBg="1" rev="0" advAuto="0" spid="416" grpId="23"/>
-      <p:bldP build="whole" bldLvl="1" animBg="1" rev="0" advAuto="0" spid="420" grpId="24"/>
-      <p:bldP build="whole" bldLvl="1" animBg="1" rev="0" advAuto="0" spid="407" grpId="13"/>
-      <p:bldP build="whole" bldLvl="1" animBg="1" rev="0" advAuto="0" spid="415" grpId="22"/>
     </p:bldLst>
   </p:timing>
 </p:sld>
@@ -23188,400 +22909,6 @@
           <a:p>
             <a:pPr/>
             <a:r>
-              <a:t>imports inside vendor</a:t>
-            </a:r>
-          </a:p>
-        </p:txBody>
-      </p:sp>
-      <p:grpSp>
-        <p:nvGrpSpPr>
-          <p:cNvPr id="430" name="Group"/>
-          <p:cNvGrpSpPr/>
-          <p:nvPr/>
-        </p:nvGrpSpPr>
-        <p:grpSpPr>
-          <a:xfrm>
-            <a:off x="1450249" y="6938010"/>
-            <a:ext cx="21483502" cy="1694180"/>
-            <a:chOff x="0" y="0"/>
-            <a:chExt cx="21483501" cy="1694178"/>
-          </a:xfrm>
-        </p:grpSpPr>
-        <p:sp>
-          <p:nvSpPr>
-            <p:cNvPr id="427" name="Rectangle"/>
-            <p:cNvSpPr/>
-            <p:nvPr/>
-          </p:nvSpPr>
-          <p:spPr>
-            <a:xfrm>
-              <a:off x="0" y="0"/>
-              <a:ext cx="21483502" cy="1694179"/>
-            </a:xfrm>
-            <a:prstGeom prst="rect">
-              <a:avLst/>
-            </a:prstGeom>
-            <a:solidFill>
-              <a:srgbClr val="37474F"/>
-            </a:solidFill>
-            <a:ln w="12700" cap="flat">
-              <a:noFill/>
-              <a:miter lim="400000"/>
-            </a:ln>
-            <a:effectLst>
-              <a:outerShdw sx="100000" sy="100000" kx="0" ky="0" algn="b" rotWithShape="0" blurRad="1016000" dist="0" dir="5400000">
-                <a:srgbClr val="000000">
-                  <a:alpha val="29797"/>
-                </a:srgbClr>
-              </a:outerShdw>
-            </a:effectLst>
-          </p:spPr>
-          <p:txBody>
-            <a:bodyPr wrap="square" lIns="71437" tIns="71437" rIns="71437" bIns="71437" numCol="1" anchor="ctr">
-              <a:noAutofit/>
-            </a:bodyPr>
-            <a:lstStyle/>
-            <a:p>
-              <a:pPr algn="ctr">
-                <a:lnSpc>
-                  <a:spcPct val="80000"/>
-                </a:lnSpc>
-                <a:spcBef>
-                  <a:spcPts val="0"/>
-                </a:spcBef>
-                <a:defRPr cap="all" sz="3800">
-                  <a:solidFill>
-                    <a:srgbClr val="FFFFFF"/>
-                  </a:solidFill>
-                  <a:latin typeface="+mn-lt"/>
-                  <a:ea typeface="+mn-ea"/>
-                  <a:cs typeface="+mn-cs"/>
-                  <a:sym typeface="DIN Condensed"/>
-                </a:defRPr>
-              </a:pPr>
-            </a:p>
-          </p:txBody>
-        </p:sp>
-        <p:sp>
-          <p:nvSpPr>
-            <p:cNvPr id="428" name="$GOPATH &lt; vendorN &lt; vendorN-1 &lt; … &lt; vendor0"/>
-            <p:cNvSpPr txBox="1"/>
-            <p:nvPr/>
-          </p:nvSpPr>
-          <p:spPr>
-            <a:xfrm>
-              <a:off x="1762402" y="274001"/>
-              <a:ext cx="19224812" cy="1146176"/>
-            </a:xfrm>
-            <a:prstGeom prst="rect">
-              <a:avLst/>
-            </a:prstGeom>
-            <a:noFill/>
-            <a:ln w="12700" cap="flat">
-              <a:noFill/>
-              <a:miter lim="400000"/>
-            </a:ln>
-            <a:effectLst/>
-            <a:extLst>
-              <a:ext uri="{C572A759-6A51-4108-AA02-DFA0A04FC94B}">
-                <ma14:wrappingTextBoxFlag xmlns:ma14="http://schemas.microsoft.com/office/mac/drawingml/2011/main" val="1"/>
-              </a:ext>
-            </a:extLst>
-          </p:spPr>
-          <p:txBody>
-            <a:bodyPr wrap="none" lIns="71437" tIns="71437" rIns="71437" bIns="71437" numCol="1" anchor="ctr">
-              <a:spAutoFit/>
-            </a:bodyPr>
-            <a:lstStyle/>
-            <a:p>
-              <a:pPr>
-                <a:defRPr sz="5800">
-                  <a:solidFill>
-                    <a:srgbClr val="FFFFFF"/>
-                  </a:solidFill>
-                  <a:latin typeface="Meslo LG M for Powerline"/>
-                  <a:ea typeface="Meslo LG M for Powerline"/>
-                  <a:cs typeface="Meslo LG M for Powerline"/>
-                  <a:sym typeface="Meslo LG M for Powerline"/>
-                </a:defRPr>
-              </a:pPr>
-              <a:r>
-                <a:t>$GOPATH &lt; vendorN &lt; </a:t>
-              </a:r>
-              <a:r>
-                <a:t>vendorN-1</a:t>
-              </a:r>
-              <a:r>
-                <a:t> &lt; … &lt; </a:t>
-              </a:r>
-              <a:r>
-                <a:t>vendor0</a:t>
-              </a:r>
-            </a:p>
-          </p:txBody>
-        </p:sp>
-        <p:pic>
-          <p:nvPicPr>
-            <p:cNvPr id="429" name="books.png" descr="books.png"/>
-            <p:cNvPicPr>
-              <a:picLocks noChangeAspect="1"/>
-            </p:cNvPicPr>
-            <p:nvPr/>
-          </p:nvPicPr>
-          <p:blipFill>
-            <a:blip r:embed="rId2">
-              <a:extLst/>
-            </a:blip>
-            <a:stretch>
-              <a:fillRect/>
-            </a:stretch>
-          </p:blipFill>
-          <p:spPr>
-            <a:xfrm>
-              <a:off x="496286" y="377350"/>
-              <a:ext cx="939478" cy="939478"/>
-            </a:xfrm>
-            <a:prstGeom prst="rect">
-              <a:avLst/>
-            </a:prstGeom>
-            <a:ln w="12700" cap="flat">
-              <a:noFill/>
-              <a:miter lim="400000"/>
-            </a:ln>
-            <a:effectLst/>
-          </p:spPr>
-        </p:pic>
-      </p:grpSp>
-      <p:pic>
-        <p:nvPicPr>
-          <p:cNvPr id="431" name="cubes.png" descr="cubes.png"/>
-          <p:cNvPicPr>
-            <a:picLocks noChangeAspect="1"/>
-          </p:cNvPicPr>
-          <p:nvPr/>
-        </p:nvPicPr>
-        <p:blipFill>
-          <a:blip r:embed="rId3">
-            <a:extLst/>
-          </a:blip>
-          <a:stretch>
-            <a:fillRect/>
-          </a:stretch>
-        </p:blipFill>
-        <p:spPr>
-          <a:xfrm>
-            <a:off x="22225000" y="2032000"/>
-            <a:ext cx="1270000" cy="1270000"/>
-          </a:xfrm>
-          <a:prstGeom prst="rect">
-            <a:avLst/>
-          </a:prstGeom>
-          <a:ln w="12700">
-            <a:miter lim="400000"/>
-          </a:ln>
-        </p:spPr>
-      </p:pic>
-    </p:spTree>
-  </p:cSld>
-  <p:clrMapOvr>
-    <a:masterClrMapping/>
-  </p:clrMapOvr>
-  <mc:AlternateContent xmlns:mc="http://schemas.openxmlformats.org/markup-compatibility/2006">
-    <mc:Choice xmlns:p14="http://schemas.microsoft.com/office/powerpoint/2010/main" Requires="p14">
-      <p:transition spd="fast" advClick="1" p14:dur="699">
-        <p:push dir="l"/>
-      </p:transition>
-    </mc:Choice>
-    <mc:Fallback>
-      <p:transition spd="fast">
-        <p:fade/>
-      </p:transition>
-    </mc:Fallback>
-  </mc:AlternateContent>
-  <p:timing>
-    <p:tnLst>
-      <p:par>
-        <p:cTn id="1" nodeType="tmRoot" restart="never" dur="indefinite" fill="hold">
-          <p:childTnLst>
-            <p:seq concurrent="1" prevAc="none" nextAc="seek">
-              <p:cTn id="2" nodeType="mainSeq" dur="indefinite" fill="hold">
-                <p:childTnLst>
-                  <p:par>
-                    <p:cTn id="3" fill="hold">
-                      <p:stCondLst>
-                        <p:cond delay="indefinite"/>
-                        <p:cond evt="onBegin">
-                          <p:tn val="2"/>
-                        </p:cond>
-                      </p:stCondLst>
-                      <p:childTnLst>
-                        <p:par>
-                          <p:cTn id="4" fill="hold">
-                            <p:stCondLst>
-                              <p:cond delay="0"/>
-                            </p:stCondLst>
-                            <p:childTnLst>
-                              <p:par>
-                                <p:cTn id="5" presetClass="entr" nodeType="afterEffect" presetSubtype="8" presetID="2" grpId="1" fill="hold">
-                                  <p:stCondLst>
-                                    <p:cond delay="0"/>
-                                  </p:stCondLst>
-                                  <p:iterate type="el" backwards="0">
-                                    <p:tmAbs val="0"/>
-                                  </p:iterate>
-                                  <p:childTnLst>
-                                    <p:set>
-                                      <p:cBhvr>
-                                        <p:cTn id="6" fill="hold"/>
-                                        <p:tgtEl>
-                                          <p:spTgt spid="430"/>
-                                        </p:tgtEl>
-                                        <p:attrNameLst>
-                                          <p:attrName>style.visibility</p:attrName>
-                                        </p:attrNameLst>
-                                      </p:cBhvr>
-                                      <p:to>
-                                        <p:strVal val="visible"/>
-                                      </p:to>
-                                    </p:set>
-                                    <p:anim calcmode="lin" valueType="num">
-                                      <p:cBhvr>
-                                        <p:cTn id="7" dur="900" fill="hold"/>
-                                        <p:tgtEl>
-                                          <p:spTgt spid="430"/>
-                                        </p:tgtEl>
-                                        <p:attrNameLst>
-                                          <p:attrName>ppt_x</p:attrName>
-                                        </p:attrNameLst>
-                                      </p:cBhvr>
-                                      <p:tavLst>
-                                        <p:tav tm="0">
-                                          <p:val>
-                                            <p:strVal val="0-#ppt_w/2"/>
-                                          </p:val>
-                                        </p:tav>
-                                        <p:tav tm="100000">
-                                          <p:val>
-                                            <p:strVal val="#ppt_x"/>
-                                          </p:val>
-                                        </p:tav>
-                                      </p:tavLst>
-                                    </p:anim>
-                                    <p:anim calcmode="lin" valueType="num">
-                                      <p:cBhvr>
-                                        <p:cTn id="8" dur="900" fill="hold"/>
-                                        <p:tgtEl>
-                                          <p:spTgt spid="430"/>
-                                        </p:tgtEl>
-                                        <p:attrNameLst>
-                                          <p:attrName>ppt_y</p:attrName>
-                                        </p:attrNameLst>
-                                      </p:cBhvr>
-                                      <p:tavLst>
-                                        <p:tav tm="0">
-                                          <p:val>
-                                            <p:strVal val="#ppt_y"/>
-                                          </p:val>
-                                        </p:tav>
-                                        <p:tav tm="100000">
-                                          <p:val>
-                                            <p:strVal val="#ppt_y"/>
-                                          </p:val>
-                                        </p:tav>
-                                      </p:tavLst>
-                                    </p:anim>
-                                  </p:childTnLst>
-                                </p:cTn>
-                              </p:par>
-                            </p:childTnLst>
-                          </p:cTn>
-                        </p:par>
-                      </p:childTnLst>
-                    </p:cTn>
-                  </p:par>
-                </p:childTnLst>
-              </p:cTn>
-              <p:prevCondLst>
-                <p:cond evt="onPrev">
-                  <p:tgtEl>
-                    <p:sldTgt/>
-                  </p:tgtEl>
-                </p:cond>
-              </p:prevCondLst>
-              <p:nextCondLst>
-                <p:cond evt="onNext">
-                  <p:tgtEl>
-                    <p:sldTgt/>
-                  </p:tgtEl>
-                </p:cond>
-              </p:nextCondLst>
-            </p:seq>
-          </p:childTnLst>
-        </p:cTn>
-      </p:par>
-    </p:tnLst>
-    <p:bldLst>
-      <p:bldP build="whole" bldLvl="1" animBg="1" rev="0" advAuto="0" spid="430" grpId="1"/>
-    </p:bldLst>
-  </p:timing>
-</p:sld>
-</file>
-
-<file path=ppt/slides/slide9.xml><?xml version="1.0" encoding="utf-8"?>
-<p:sld xmlns:a="http://schemas.openxmlformats.org/drawingml/2006/main" xmlns:r="http://schemas.openxmlformats.org/officeDocument/2006/relationships" xmlns:p="http://schemas.openxmlformats.org/presentationml/2006/main" xmlns:m="http://schemas.openxmlformats.org/officeDocument/2006/math" xmlns:a14="http://schemas.microsoft.com/office/drawing/2010/main" showMasterSp="1" showMasterPhAnim="1">
-  <p:cSld>
-    <p:bg>
-      <p:bgPr>
-        <a:solidFill>
-          <a:srgbClr val="002833"/>
-        </a:solidFill>
-      </p:bgPr>
-    </p:bg>
-    <p:spTree>
-      <p:nvGrpSpPr>
-        <p:cNvPr id="1" name=""/>
-        <p:cNvGrpSpPr/>
-        <p:nvPr/>
-      </p:nvGrpSpPr>
-      <p:grpSpPr>
-        <a:xfrm>
-          <a:off x="0" y="0"/>
-          <a:ext cx="0" cy="0"/>
-          <a:chOff x="0" y="0"/>
-          <a:chExt cx="0" cy="0"/>
-        </a:xfrm>
-      </p:grpSpPr>
-      <p:sp>
-        <p:nvSpPr>
-          <p:cNvPr id="433" name="Title 6"/>
-          <p:cNvSpPr txBox="1"/>
-          <p:nvPr>
-            <p:ph type="title"/>
-          </p:nvPr>
-        </p:nvSpPr>
-        <p:spPr>
-          <a:xfrm>
-            <a:off x="7106129" y="1119893"/>
-            <a:ext cx="10171742" cy="1288881"/>
-          </a:xfrm>
-          <a:prstGeom prst="rect">
-            <a:avLst/>
-          </a:prstGeom>
-        </p:spPr>
-        <p:txBody>
-          <a:bodyPr/>
-          <a:lstStyle>
-            <a:lvl1pPr algn="ctr">
-              <a:defRPr sz="8000">
-                <a:solidFill>
-                  <a:srgbClr val="66C2FF"/>
-                </a:solidFill>
-              </a:defRPr>
-            </a:lvl1pPr>
-          </a:lstStyle>
-          <a:p>
-            <a:pPr/>
-            <a:r>
               <a:t>Import shadowing</a:t>
             </a:r>
           </a:p>
@@ -23589,7 +22916,7 @@
       </p:sp>
       <p:pic>
         <p:nvPicPr>
-          <p:cNvPr id="434" name="cubes.png" descr="cubes.png"/>
+          <p:cNvPr id="427" name="cubes.png" descr="cubes.png"/>
           <p:cNvPicPr>
             <a:picLocks noChangeAspect="1"/>
           </p:cNvPicPr>
@@ -23618,7 +22945,7 @@
       </p:pic>
       <p:grpSp>
         <p:nvGrpSpPr>
-          <p:cNvPr id="437" name="Group"/>
+          <p:cNvPr id="430" name="Group"/>
           <p:cNvGrpSpPr/>
           <p:nvPr/>
         </p:nvGrpSpPr>
@@ -23632,7 +22959,7 @@
         </p:grpSpPr>
         <p:sp>
           <p:nvSpPr>
-            <p:cNvPr id="435" name="Rectangle"/>
+            <p:cNvPr id="428" name="Rectangle"/>
             <p:cNvSpPr/>
             <p:nvPr/>
           </p:nvSpPr>
@@ -23681,7 +23008,7 @@
         </p:sp>
         <p:sp>
           <p:nvSpPr>
-            <p:cNvPr id="436" name="package 3"/>
+            <p:cNvPr id="429" name="package 3"/>
             <p:cNvSpPr/>
             <p:nvPr/>
           </p:nvSpPr>
@@ -23733,7 +23060,7 @@
       </p:grpSp>
       <p:grpSp>
         <p:nvGrpSpPr>
-          <p:cNvPr id="440" name="Group"/>
+          <p:cNvPr id="433" name="Group"/>
           <p:cNvGrpSpPr/>
           <p:nvPr/>
         </p:nvGrpSpPr>
@@ -23747,7 +23074,7 @@
         </p:grpSpPr>
         <p:sp>
           <p:nvSpPr>
-            <p:cNvPr id="438" name="Rectangle"/>
+            <p:cNvPr id="431" name="Rectangle"/>
             <p:cNvSpPr/>
             <p:nvPr/>
           </p:nvSpPr>
@@ -23796,7 +23123,7 @@
         </p:sp>
         <p:sp>
           <p:nvSpPr>
-            <p:cNvPr id="439" name="main"/>
+            <p:cNvPr id="432" name="main"/>
             <p:cNvSpPr/>
             <p:nvPr/>
           </p:nvSpPr>
@@ -23848,7 +23175,7 @@
       </p:grpSp>
       <p:grpSp>
         <p:nvGrpSpPr>
-          <p:cNvPr id="443" name="Group"/>
+          <p:cNvPr id="436" name="Group"/>
           <p:cNvGrpSpPr/>
           <p:nvPr/>
         </p:nvGrpSpPr>
@@ -23862,7 +23189,7 @@
         </p:grpSpPr>
         <p:sp>
           <p:nvSpPr>
-            <p:cNvPr id="441" name="Rectangle"/>
+            <p:cNvPr id="434" name="Rectangle"/>
             <p:cNvSpPr/>
             <p:nvPr/>
           </p:nvSpPr>
@@ -23911,7 +23238,7 @@
         </p:sp>
         <p:sp>
           <p:nvSpPr>
-            <p:cNvPr id="442" name="package1"/>
+            <p:cNvPr id="435" name="package1"/>
             <p:cNvSpPr/>
             <p:nvPr/>
           </p:nvSpPr>
@@ -23963,7 +23290,7 @@
       </p:grpSp>
       <p:grpSp>
         <p:nvGrpSpPr>
-          <p:cNvPr id="446" name="Group"/>
+          <p:cNvPr id="439" name="Group"/>
           <p:cNvGrpSpPr/>
           <p:nvPr/>
         </p:nvGrpSpPr>
@@ -23977,7 +23304,7 @@
         </p:grpSpPr>
         <p:sp>
           <p:nvSpPr>
-            <p:cNvPr id="444" name="Rectangle"/>
+            <p:cNvPr id="437" name="Rectangle"/>
             <p:cNvSpPr/>
             <p:nvPr/>
           </p:nvSpPr>
@@ -24026,7 +23353,7 @@
         </p:sp>
         <p:sp>
           <p:nvSpPr>
-            <p:cNvPr id="445" name="package2"/>
+            <p:cNvPr id="438" name="package2"/>
             <p:cNvSpPr/>
             <p:nvPr/>
           </p:nvSpPr>
@@ -24078,7 +23405,7 @@
       </p:grpSp>
       <p:grpSp>
         <p:nvGrpSpPr>
-          <p:cNvPr id="449" name="Group"/>
+          <p:cNvPr id="442" name="Group"/>
           <p:cNvGrpSpPr/>
           <p:nvPr/>
         </p:nvGrpSpPr>
@@ -24092,7 +23419,7 @@
         </p:grpSpPr>
         <p:sp>
           <p:nvSpPr>
-            <p:cNvPr id="447" name="Rectangle"/>
+            <p:cNvPr id="440" name="Rectangle"/>
             <p:cNvSpPr/>
             <p:nvPr/>
           </p:nvSpPr>
@@ -24141,7 +23468,7 @@
         </p:sp>
         <p:sp>
           <p:nvSpPr>
-            <p:cNvPr id="448" name="package3"/>
+            <p:cNvPr id="441" name="package3"/>
             <p:cNvSpPr/>
             <p:nvPr/>
           </p:nvSpPr>
@@ -24193,7 +23520,7 @@
       </p:grpSp>
       <p:grpSp>
         <p:nvGrpSpPr>
-          <p:cNvPr id="453" name="Group"/>
+          <p:cNvPr id="446" name="Group"/>
           <p:cNvGrpSpPr/>
           <p:nvPr/>
         </p:nvGrpSpPr>
@@ -24207,7 +23534,7 @@
         </p:grpSpPr>
         <p:sp>
           <p:nvSpPr>
-            <p:cNvPr id="450" name="Rectangle"/>
+            <p:cNvPr id="443" name="Rectangle"/>
             <p:cNvSpPr/>
             <p:nvPr/>
           </p:nvSpPr>
@@ -24256,7 +23583,7 @@
         </p:sp>
         <p:sp>
           <p:nvSpPr>
-            <p:cNvPr id="451" name="vendor/github.com/steevehook/project"/>
+            <p:cNvPr id="444" name="vendor/github.com/steevehook/project"/>
             <p:cNvSpPr txBox="1"/>
             <p:nvPr/>
           </p:nvSpPr>
@@ -24314,7 +23641,7 @@
         </p:sp>
         <p:pic>
           <p:nvPicPr>
-            <p:cNvPr id="452" name="folder (1).png" descr="folder (1).png"/>
+            <p:cNvPr id="445" name="folder (1).png" descr="folder (1).png"/>
             <p:cNvPicPr>
               <a:picLocks noChangeAspect="1"/>
             </p:cNvPicPr>
@@ -24347,7 +23674,7 @@
       </p:grpSp>
       <p:grpSp>
         <p:nvGrpSpPr>
-          <p:cNvPr id="457" name="Group"/>
+          <p:cNvPr id="450" name="Group"/>
           <p:cNvGrpSpPr/>
           <p:nvPr/>
         </p:nvGrpSpPr>
@@ -24361,7 +23688,7 @@
         </p:grpSpPr>
         <p:sp>
           <p:nvSpPr>
-            <p:cNvPr id="454" name="Rectangle"/>
+            <p:cNvPr id="447" name="Rectangle"/>
             <p:cNvSpPr/>
             <p:nvPr/>
           </p:nvSpPr>
@@ -24410,7 +23737,7 @@
         </p:sp>
         <p:sp>
           <p:nvSpPr>
-            <p:cNvPr id="455" name="$GOPATH/src/github.com/steevehook/project"/>
+            <p:cNvPr id="448" name="$GOPATH/src/github.com/steevehook/project"/>
             <p:cNvSpPr txBox="1"/>
             <p:nvPr/>
           </p:nvSpPr>
@@ -24468,7 +23795,7 @@
         </p:sp>
         <p:pic>
           <p:nvPicPr>
-            <p:cNvPr id="456" name="folder (1).png" descr="folder (1).png"/>
+            <p:cNvPr id="449" name="folder (1).png" descr="folder (1).png"/>
             <p:cNvPicPr>
               <a:picLocks noChangeAspect="1"/>
             </p:cNvPicPr>
@@ -24501,7 +23828,7 @@
       </p:grpSp>
       <p:pic>
         <p:nvPicPr>
-          <p:cNvPr id="458" name="Line Line" descr="Line Line"/>
+          <p:cNvPr id="451" name="Line Line" descr="Line Line"/>
           <p:cNvPicPr>
             <a:picLocks noChangeAspect="0"/>
           </p:cNvPicPr>
@@ -24527,7 +23854,7 @@
       </p:pic>
       <p:pic>
         <p:nvPicPr>
-          <p:cNvPr id="460" name="Line Line" descr="Line Line"/>
+          <p:cNvPr id="453" name="Line Line" descr="Line Line"/>
           <p:cNvPicPr>
             <a:picLocks noChangeAspect="0"/>
           </p:cNvPicPr>
@@ -24553,7 +23880,7 @@
       </p:pic>
       <p:pic>
         <p:nvPicPr>
-          <p:cNvPr id="462" name="Line Line" descr="Line Line"/>
+          <p:cNvPr id="455" name="Line Line" descr="Line Line"/>
           <p:cNvPicPr>
             <a:picLocks noChangeAspect="0"/>
           </p:cNvPicPr>
@@ -24579,7 +23906,7 @@
       </p:pic>
       <p:pic>
         <p:nvPicPr>
-          <p:cNvPr id="464" name="Line Line" descr="Line Line"/>
+          <p:cNvPr id="457" name="Line Line" descr="Line Line"/>
           <p:cNvPicPr>
             <a:picLocks noChangeAspect="0"/>
           </p:cNvPicPr>
@@ -24605,7 +23932,7 @@
       </p:pic>
       <p:pic>
         <p:nvPicPr>
-          <p:cNvPr id="466" name="Line Line" descr="Line Line"/>
+          <p:cNvPr id="459" name="Line Line" descr="Line Line"/>
           <p:cNvPicPr>
             <a:picLocks noChangeAspect="0"/>
           </p:cNvPicPr>
@@ -24631,7 +23958,7 @@
       </p:pic>
       <p:pic>
         <p:nvPicPr>
-          <p:cNvPr id="468" name="Line Line" descr="Line Line"/>
+          <p:cNvPr id="461" name="Line Line" descr="Line Line"/>
           <p:cNvPicPr>
             <a:picLocks noChangeAspect="0"/>
           </p:cNvPicPr>
@@ -24657,7 +23984,7 @@
       </p:pic>
       <p:pic>
         <p:nvPicPr>
-          <p:cNvPr id="470" name="Line Line" descr="Line Line"/>
+          <p:cNvPr id="463" name="Line Line" descr="Line Line"/>
           <p:cNvPicPr>
             <a:picLocks noChangeAspect="0"/>
           </p:cNvPicPr>
@@ -24683,7 +24010,7 @@
       </p:pic>
       <p:pic>
         <p:nvPicPr>
-          <p:cNvPr id="472" name="Line Line" descr="Line Line"/>
+          <p:cNvPr id="465" name="Line Line" descr="Line Line"/>
           <p:cNvPicPr>
             <a:picLocks noChangeAspect="0"/>
           </p:cNvPicPr>
@@ -24709,7 +24036,7 @@
       </p:pic>
       <p:grpSp>
         <p:nvGrpSpPr>
-          <p:cNvPr id="476" name="Group"/>
+          <p:cNvPr id="469" name="Group"/>
           <p:cNvGrpSpPr/>
           <p:nvPr/>
         </p:nvGrpSpPr>
@@ -24723,7 +24050,7 @@
         </p:grpSpPr>
         <p:sp>
           <p:nvSpPr>
-            <p:cNvPr id="474" name="Rectangle"/>
+            <p:cNvPr id="467" name="Rectangle"/>
             <p:cNvSpPr/>
             <p:nvPr/>
           </p:nvSpPr>
@@ -24772,7 +24099,7 @@
         </p:sp>
         <p:sp>
           <p:nvSpPr>
-            <p:cNvPr id="475" name="package main…"/>
+            <p:cNvPr id="468" name="package main…"/>
             <p:cNvSpPr/>
             <p:nvPr/>
           </p:nvSpPr>
@@ -24986,7 +24313,7 @@
       </p:grpSp>
       <p:sp>
         <p:nvSpPr>
-          <p:cNvPr id="477" name="Rectangle"/>
+          <p:cNvPr id="470" name="Rectangle"/>
           <p:cNvSpPr/>
           <p:nvPr/>
         </p:nvSpPr>
@@ -25082,7 +24409,7 @@
                                       <p:cBhvr>
                                         <p:cTn id="6" fill="hold"/>
                                         <p:tgtEl>
-                                          <p:spTgt spid="457"/>
+                                          <p:spTgt spid="450"/>
                                         </p:tgtEl>
                                         <p:attrNameLst>
                                           <p:attrName>style.visibility</p:attrName>
@@ -25096,7 +24423,7 @@
                                       <p:cBhvr>
                                         <p:cTn id="7" dur="500" fill="hold"/>
                                         <p:tgtEl>
-                                          <p:spTgt spid="457"/>
+                                          <p:spTgt spid="450"/>
                                         </p:tgtEl>
                                         <p:attrNameLst>
                                           <p:attrName>ppt_x</p:attrName>
@@ -25119,7 +24446,7 @@
                                       <p:cBhvr>
                                         <p:cTn id="8" dur="500" fill="hold"/>
                                         <p:tgtEl>
-                                          <p:spTgt spid="457"/>
+                                          <p:spTgt spid="450"/>
                                         </p:tgtEl>
                                         <p:attrNameLst>
                                           <p:attrName>ppt_y</p:attrName>
@@ -25163,7 +24490,7 @@
                                       <p:cBhvr>
                                         <p:cTn id="11" fill="hold"/>
                                         <p:tgtEl>
-                                          <p:spTgt spid="458"/>
+                                          <p:spTgt spid="451"/>
                                         </p:tgtEl>
                                         <p:attrNameLst>
                                           <p:attrName>style.visibility</p:attrName>
@@ -25177,7 +24504,7 @@
                                       <p:cBhvr>
                                         <p:cTn id="12" dur="300"/>
                                         <p:tgtEl>
-                                          <p:spTgt spid="458"/>
+                                          <p:spTgt spid="451"/>
                                         </p:tgtEl>
                                       </p:cBhvr>
                                     </p:animEffect>
@@ -25206,7 +24533,7 @@
                                       <p:cBhvr>
                                         <p:cTn id="15" fill="hold"/>
                                         <p:tgtEl>
-                                          <p:spTgt spid="460"/>
+                                          <p:spTgt spid="453"/>
                                         </p:tgtEl>
                                         <p:attrNameLst>
                                           <p:attrName>style.visibility</p:attrName>
@@ -25220,7 +24547,7 @@
                                       <p:cBhvr>
                                         <p:cTn id="16" dur="300"/>
                                         <p:tgtEl>
-                                          <p:spTgt spid="460"/>
+                                          <p:spTgt spid="453"/>
                                         </p:tgtEl>
                                       </p:cBhvr>
                                     </p:animEffect>
@@ -25249,7 +24576,7 @@
                                       <p:cBhvr>
                                         <p:cTn id="19" fill="hold"/>
                                         <p:tgtEl>
-                                          <p:spTgt spid="443"/>
+                                          <p:spTgt spid="436"/>
                                         </p:tgtEl>
                                         <p:attrNameLst>
                                           <p:attrName>style.visibility</p:attrName>
@@ -25263,7 +24590,7 @@
                                       <p:cBhvr>
                                         <p:cTn id="20" dur="500" fill="hold"/>
                                         <p:tgtEl>
-                                          <p:spTgt spid="443"/>
+                                          <p:spTgt spid="436"/>
                                         </p:tgtEl>
                                         <p:attrNameLst>
                                           <p:attrName>ppt_x</p:attrName>
@@ -25286,7 +24613,7 @@
                                       <p:cBhvr>
                                         <p:cTn id="21" dur="500" fill="hold"/>
                                         <p:tgtEl>
-                                          <p:spTgt spid="443"/>
+                                          <p:spTgt spid="436"/>
                                         </p:tgtEl>
                                         <p:attrNameLst>
                                           <p:attrName>ppt_y</p:attrName>
@@ -25330,7 +24657,7 @@
                                       <p:cBhvr>
                                         <p:cTn id="24" fill="hold"/>
                                         <p:tgtEl>
-                                          <p:spTgt spid="462"/>
+                                          <p:spTgt spid="455"/>
                                         </p:tgtEl>
                                         <p:attrNameLst>
                                           <p:attrName>style.visibility</p:attrName>
@@ -25344,7 +24671,7 @@
                                       <p:cBhvr>
                                         <p:cTn id="25" dur="300"/>
                                         <p:tgtEl>
-                                          <p:spTgt spid="462"/>
+                                          <p:spTgt spid="455"/>
                                         </p:tgtEl>
                                       </p:cBhvr>
                                     </p:animEffect>
@@ -25373,7 +24700,7 @@
                                       <p:cBhvr>
                                         <p:cTn id="28" fill="hold"/>
                                         <p:tgtEl>
-                                          <p:spTgt spid="446"/>
+                                          <p:spTgt spid="439"/>
                                         </p:tgtEl>
                                         <p:attrNameLst>
                                           <p:attrName>style.visibility</p:attrName>
@@ -25387,7 +24714,7 @@
                                       <p:cBhvr>
                                         <p:cTn id="29" dur="500" fill="hold"/>
                                         <p:tgtEl>
-                                          <p:spTgt spid="446"/>
+                                          <p:spTgt spid="439"/>
                                         </p:tgtEl>
                                         <p:attrNameLst>
                                           <p:attrName>ppt_x</p:attrName>
@@ -25410,7 +24737,7 @@
                                       <p:cBhvr>
                                         <p:cTn id="30" dur="500" fill="hold"/>
                                         <p:tgtEl>
-                                          <p:spTgt spid="446"/>
+                                          <p:spTgt spid="439"/>
                                         </p:tgtEl>
                                         <p:attrNameLst>
                                           <p:attrName>ppt_y</p:attrName>
@@ -25454,7 +24781,7 @@
                                       <p:cBhvr>
                                         <p:cTn id="33" fill="hold"/>
                                         <p:tgtEl>
-                                          <p:spTgt spid="464"/>
+                                          <p:spTgt spid="457"/>
                                         </p:tgtEl>
                                         <p:attrNameLst>
                                           <p:attrName>style.visibility</p:attrName>
@@ -25468,7 +24795,7 @@
                                       <p:cBhvr>
                                         <p:cTn id="34" dur="300"/>
                                         <p:tgtEl>
-                                          <p:spTgt spid="464"/>
+                                          <p:spTgt spid="457"/>
                                         </p:tgtEl>
                                       </p:cBhvr>
                                     </p:animEffect>
@@ -25497,7 +24824,7 @@
                                       <p:cBhvr>
                                         <p:cTn id="37" fill="hold"/>
                                         <p:tgtEl>
-                                          <p:spTgt spid="449"/>
+                                          <p:spTgt spid="442"/>
                                         </p:tgtEl>
                                         <p:attrNameLst>
                                           <p:attrName>style.visibility</p:attrName>
@@ -25511,7 +24838,7 @@
                                       <p:cBhvr>
                                         <p:cTn id="38" dur="500" fill="hold"/>
                                         <p:tgtEl>
-                                          <p:spTgt spid="449"/>
+                                          <p:spTgt spid="442"/>
                                         </p:tgtEl>
                                         <p:attrNameLst>
                                           <p:attrName>ppt_x</p:attrName>
@@ -25534,7 +24861,7 @@
                                       <p:cBhvr>
                                         <p:cTn id="39" dur="500" fill="hold"/>
                                         <p:tgtEl>
-                                          <p:spTgt spid="449"/>
+                                          <p:spTgt spid="442"/>
                                         </p:tgtEl>
                                         <p:attrNameLst>
                                           <p:attrName>ppt_y</p:attrName>
@@ -25578,7 +24905,7 @@
                                       <p:cBhvr>
                                         <p:cTn id="42" fill="hold"/>
                                         <p:tgtEl>
-                                          <p:spTgt spid="466"/>
+                                          <p:spTgt spid="459"/>
                                         </p:tgtEl>
                                         <p:attrNameLst>
                                           <p:attrName>style.visibility</p:attrName>
@@ -25592,7 +24919,7 @@
                                       <p:cBhvr>
                                         <p:cTn id="43" dur="300"/>
                                         <p:tgtEl>
-                                          <p:spTgt spid="466"/>
+                                          <p:spTgt spid="459"/>
                                         </p:tgtEl>
                                       </p:cBhvr>
                                     </p:animEffect>
@@ -25621,7 +24948,7 @@
                                       <p:cBhvr>
                                         <p:cTn id="46" fill="hold"/>
                                         <p:tgtEl>
-                                          <p:spTgt spid="440"/>
+                                          <p:spTgt spid="433"/>
                                         </p:tgtEl>
                                         <p:attrNameLst>
                                           <p:attrName>style.visibility</p:attrName>
@@ -25635,7 +24962,7 @@
                                       <p:cBhvr>
                                         <p:cTn id="47" dur="500" fill="hold"/>
                                         <p:tgtEl>
-                                          <p:spTgt spid="440"/>
+                                          <p:spTgt spid="433"/>
                                         </p:tgtEl>
                                         <p:attrNameLst>
                                           <p:attrName>ppt_x</p:attrName>
@@ -25658,7 +24985,7 @@
                                       <p:cBhvr>
                                         <p:cTn id="48" dur="500" fill="hold"/>
                                         <p:tgtEl>
-                                          <p:spTgt spid="440"/>
+                                          <p:spTgt spid="433"/>
                                         </p:tgtEl>
                                         <p:attrNameLst>
                                           <p:attrName>ppt_y</p:attrName>
@@ -25702,7 +25029,7 @@
                                       <p:cBhvr>
                                         <p:cTn id="51" fill="hold"/>
                                         <p:tgtEl>
-                                          <p:spTgt spid="472"/>
+                                          <p:spTgt spid="465"/>
                                         </p:tgtEl>
                                         <p:attrNameLst>
                                           <p:attrName>style.visibility</p:attrName>
@@ -25716,7 +25043,7 @@
                                       <p:cBhvr>
                                         <p:cTn id="52" dur="300"/>
                                         <p:tgtEl>
-                                          <p:spTgt spid="472"/>
+                                          <p:spTgt spid="465"/>
                                         </p:tgtEl>
                                       </p:cBhvr>
                                     </p:animEffect>
@@ -25745,7 +25072,7 @@
                                       <p:cBhvr>
                                         <p:cTn id="55" fill="hold"/>
                                         <p:tgtEl>
-                                          <p:spTgt spid="453"/>
+                                          <p:spTgt spid="446"/>
                                         </p:tgtEl>
                                         <p:attrNameLst>
                                           <p:attrName>style.visibility</p:attrName>
@@ -25759,7 +25086,7 @@
                                       <p:cBhvr>
                                         <p:cTn id="56" dur="500" fill="hold"/>
                                         <p:tgtEl>
-                                          <p:spTgt spid="453"/>
+                                          <p:spTgt spid="446"/>
                                         </p:tgtEl>
                                         <p:attrNameLst>
                                           <p:attrName>ppt_x</p:attrName>
@@ -25782,7 +25109,7 @@
                                       <p:cBhvr>
                                         <p:cTn id="57" dur="500" fill="hold"/>
                                         <p:tgtEl>
-                                          <p:spTgt spid="453"/>
+                                          <p:spTgt spid="446"/>
                                         </p:tgtEl>
                                         <p:attrNameLst>
                                           <p:attrName>ppt_y</p:attrName>
@@ -25826,7 +25153,7 @@
                                       <p:cBhvr>
                                         <p:cTn id="60" fill="hold"/>
                                         <p:tgtEl>
-                                          <p:spTgt spid="468"/>
+                                          <p:spTgt spid="461"/>
                                         </p:tgtEl>
                                         <p:attrNameLst>
                                           <p:attrName>style.visibility</p:attrName>
@@ -25840,7 +25167,7 @@
                                       <p:cBhvr>
                                         <p:cTn id="61" dur="300"/>
                                         <p:tgtEl>
-                                          <p:spTgt spid="468"/>
+                                          <p:spTgt spid="461"/>
                                         </p:tgtEl>
                                       </p:cBhvr>
                                     </p:animEffect>
@@ -25869,7 +25196,7 @@
                                       <p:cBhvr>
                                         <p:cTn id="64" fill="hold"/>
                                         <p:tgtEl>
-                                          <p:spTgt spid="470"/>
+                                          <p:spTgt spid="463"/>
                                         </p:tgtEl>
                                         <p:attrNameLst>
                                           <p:attrName>style.visibility</p:attrName>
@@ -25883,7 +25210,7 @@
                                       <p:cBhvr>
                                         <p:cTn id="65" dur="300"/>
                                         <p:tgtEl>
-                                          <p:spTgt spid="470"/>
+                                          <p:spTgt spid="463"/>
                                         </p:tgtEl>
                                       </p:cBhvr>
                                     </p:animEffect>
@@ -25912,7 +25239,7 @@
                                       <p:cBhvr>
                                         <p:cTn id="68" fill="hold"/>
                                         <p:tgtEl>
-                                          <p:spTgt spid="437"/>
+                                          <p:spTgt spid="430"/>
                                         </p:tgtEl>
                                         <p:attrNameLst>
                                           <p:attrName>style.visibility</p:attrName>
@@ -25926,7 +25253,7 @@
                                       <p:cBhvr>
                                         <p:cTn id="69" dur="500" fill="hold"/>
                                         <p:tgtEl>
-                                          <p:spTgt spid="437"/>
+                                          <p:spTgt spid="430"/>
                                         </p:tgtEl>
                                         <p:attrNameLst>
                                           <p:attrName>ppt_x</p:attrName>
@@ -25949,7 +25276,7 @@
                                       <p:cBhvr>
                                         <p:cTn id="70" dur="500" fill="hold"/>
                                         <p:tgtEl>
-                                          <p:spTgt spid="437"/>
+                                          <p:spTgt spid="430"/>
                                         </p:tgtEl>
                                         <p:attrNameLst>
                                           <p:attrName>ppt_y</p:attrName>
@@ -26002,7 +25329,7 @@
                                       <p:cBhvr>
                                         <p:cTn id="74" fill="hold"/>
                                         <p:tgtEl>
-                                          <p:spTgt spid="476"/>
+                                          <p:spTgt spid="469"/>
                                         </p:tgtEl>
                                         <p:attrNameLst>
                                           <p:attrName>style.visibility</p:attrName>
@@ -26016,7 +25343,7 @@
                                       <p:cBhvr>
                                         <p:cTn id="75" dur="700"/>
                                         <p:tgtEl>
-                                          <p:spTgt spid="476"/>
+                                          <p:spTgt spid="469"/>
                                         </p:tgtEl>
                                       </p:cBhvr>
                                     </p:animEffect>
@@ -26045,7 +25372,7 @@
                                       <p:cBhvr>
                                         <p:cTn id="78" fill="hold"/>
                                         <p:tgtEl>
-                                          <p:spTgt spid="477"/>
+                                          <p:spTgt spid="470"/>
                                         </p:tgtEl>
                                         <p:attrNameLst>
                                           <p:attrName>style.visibility</p:attrName>
@@ -26059,7 +25386,7 @@
                                       <p:cBhvr>
                                         <p:cTn id="79" dur="600"/>
                                         <p:tgtEl>
-                                          <p:spTgt spid="477"/>
+                                          <p:spTgt spid="470"/>
                                         </p:tgtEl>
                                       </p:cBhvr>
                                     </p:animEffect>
@@ -26094,23 +25421,301 @@
       </p:par>
     </p:tnLst>
     <p:bldLst>
-      <p:bldP build="whole" bldLvl="1" animBg="1" rev="0" advAuto="0" spid="458" grpId="2"/>
-      <p:bldP build="whole" bldLvl="1" animBg="1" rev="0" advAuto="0" spid="449" grpId="8"/>
-      <p:bldP build="whole" bldLvl="1" animBg="1" rev="0" advAuto="0" spid="466" grpId="9"/>
-      <p:bldP build="whole" bldLvl="1" animBg="1" rev="0" advAuto="0" spid="460" grpId="3"/>
-      <p:bldP build="whole" bldLvl="1" animBg="1" rev="0" advAuto="0" spid="462" grpId="5"/>
-      <p:bldP build="whole" bldLvl="1" animBg="1" rev="0" advAuto="0" spid="476" grpId="16"/>
-      <p:bldP build="whole" bldLvl="1" animBg="1" rev="0" advAuto="0" spid="464" grpId="7"/>
-      <p:bldP build="whole" bldLvl="1" animBg="1" rev="0" advAuto="0" spid="470" grpId="14"/>
-      <p:bldP build="whole" bldLvl="1" animBg="1" rev="0" advAuto="0" spid="443" grpId="4"/>
-      <p:bldP build="whole" bldLvl="1" animBg="1" rev="0" advAuto="0" spid="472" grpId="11"/>
-      <p:bldP build="whole" bldLvl="1" animBg="1" rev="0" advAuto="0" spid="477" grpId="17"/>
-      <p:bldP build="whole" bldLvl="1" animBg="1" rev="0" advAuto="0" spid="468" grpId="13"/>
-      <p:bldP build="whole" bldLvl="1" animBg="1" rev="0" advAuto="0" spid="437" grpId="15"/>
-      <p:bldP build="whole" bldLvl="1" animBg="1" rev="0" advAuto="0" spid="446" grpId="6"/>
-      <p:bldP build="whole" bldLvl="1" animBg="1" rev="0" advAuto="0" spid="440" grpId="10"/>
-      <p:bldP build="whole" bldLvl="1" animBg="1" rev="0" advAuto="0" spid="453" grpId="12"/>
-      <p:bldP build="whole" bldLvl="1" animBg="1" rev="0" advAuto="0" spid="457" grpId="1"/>
+      <p:bldP build="whole" bldLvl="1" animBg="1" rev="0" advAuto="0" spid="442" grpId="8"/>
+      <p:bldP build="whole" bldLvl="1" animBg="1" rev="0" advAuto="0" spid="450" grpId="1"/>
+      <p:bldP build="whole" bldLvl="1" animBg="1" rev="0" advAuto="0" spid="446" grpId="12"/>
+      <p:bldP build="whole" bldLvl="1" animBg="1" rev="0" advAuto="0" spid="463" grpId="14"/>
+      <p:bldP build="whole" bldLvl="1" animBg="1" rev="0" advAuto="0" spid="430" grpId="15"/>
+      <p:bldP build="whole" bldLvl="1" animBg="1" rev="0" advAuto="0" spid="469" grpId="16"/>
+      <p:bldP build="whole" bldLvl="1" animBg="1" rev="0" advAuto="0" spid="455" grpId="5"/>
+      <p:bldP build="whole" bldLvl="1" animBg="1" rev="0" advAuto="0" spid="451" grpId="2"/>
+      <p:bldP build="whole" bldLvl="1" animBg="1" rev="0" advAuto="0" spid="457" grpId="7"/>
+      <p:bldP build="whole" bldLvl="1" animBg="1" rev="0" advAuto="0" spid="459" grpId="9"/>
+      <p:bldP build="whole" bldLvl="1" animBg="1" rev="0" advAuto="0" spid="461" grpId="13"/>
+      <p:bldP build="whole" bldLvl="1" animBg="1" rev="0" advAuto="0" spid="470" grpId="17"/>
+      <p:bldP build="whole" bldLvl="1" animBg="1" rev="0" advAuto="0" spid="439" grpId="6"/>
+      <p:bldP build="whole" bldLvl="1" animBg="1" rev="0" advAuto="0" spid="436" grpId="4"/>
+      <p:bldP build="whole" bldLvl="1" animBg="1" rev="0" advAuto="0" spid="433" grpId="10"/>
+      <p:bldP build="whole" bldLvl="1" animBg="1" rev="0" advAuto="0" spid="465" grpId="11"/>
+      <p:bldP build="whole" bldLvl="1" animBg="1" rev="0" advAuto="0" spid="453" grpId="3"/>
+    </p:bldLst>
+  </p:timing>
+</p:sld>
+</file>
+
+<file path=ppt/slides/slide9.xml><?xml version="1.0" encoding="utf-8"?>
+<p:sld xmlns:a="http://schemas.openxmlformats.org/drawingml/2006/main" xmlns:r="http://schemas.openxmlformats.org/officeDocument/2006/relationships" xmlns:p="http://schemas.openxmlformats.org/presentationml/2006/main" xmlns:m="http://schemas.openxmlformats.org/officeDocument/2006/math" xmlns:a14="http://schemas.microsoft.com/office/drawing/2010/main" showMasterSp="1" showMasterPhAnim="1">
+  <p:cSld>
+    <p:bg>
+      <p:bgPr>
+        <a:solidFill>
+          <a:srgbClr val="002833"/>
+        </a:solidFill>
+      </p:bgPr>
+    </p:bg>
+    <p:spTree>
+      <p:nvGrpSpPr>
+        <p:cNvPr id="1" name=""/>
+        <p:cNvGrpSpPr/>
+        <p:nvPr/>
+      </p:nvGrpSpPr>
+      <p:grpSpPr>
+        <a:xfrm>
+          <a:off x="0" y="0"/>
+          <a:ext cx="0" cy="0"/>
+          <a:chOff x="0" y="0"/>
+          <a:chExt cx="0" cy="0"/>
+        </a:xfrm>
+      </p:grpSpPr>
+      <p:sp>
+        <p:nvSpPr>
+          <p:cNvPr id="472" name="Title 6"/>
+          <p:cNvSpPr txBox="1"/>
+          <p:nvPr>
+            <p:ph type="title"/>
+          </p:nvPr>
+        </p:nvSpPr>
+        <p:spPr>
+          <a:xfrm>
+            <a:off x="4096229" y="1119893"/>
+            <a:ext cx="16191542" cy="1288881"/>
+          </a:xfrm>
+          <a:prstGeom prst="rect">
+            <a:avLst/>
+          </a:prstGeom>
+        </p:spPr>
+        <p:txBody>
+          <a:bodyPr/>
+          <a:lstStyle>
+            <a:lvl1pPr algn="ctr">
+              <a:defRPr sz="8000">
+                <a:solidFill>
+                  <a:srgbClr val="66C2FF"/>
+                </a:solidFill>
+              </a:defRPr>
+            </a:lvl1pPr>
+          </a:lstStyle>
+          <a:p>
+            <a:pPr/>
+            <a:r>
+              <a:t>import path checking is disabled for vendor</a:t>
+            </a:r>
+          </a:p>
+        </p:txBody>
+      </p:sp>
+      <p:sp>
+        <p:nvSpPr>
+          <p:cNvPr id="473" name="Title 6"/>
+          <p:cNvSpPr txBox="1"/>
+          <p:nvPr/>
+        </p:nvSpPr>
+        <p:spPr>
+          <a:xfrm>
+            <a:off x="3902985" y="1119893"/>
+            <a:ext cx="16578030" cy="1288881"/>
+          </a:xfrm>
+          <a:prstGeom prst="rect">
+            <a:avLst/>
+          </a:prstGeom>
+          <a:ln w="12700">
+            <a:miter lim="400000"/>
+          </a:ln>
+          <a:extLst>
+            <a:ext uri="{C572A759-6A51-4108-AA02-DFA0A04FC94B}">
+              <ma14:wrappingTextBoxFlag xmlns:ma14="http://schemas.microsoft.com/office/mac/drawingml/2011/main" val="1"/>
+            </a:ext>
+          </a:extLst>
+        </p:spPr>
+        <p:txBody>
+          <a:bodyPr lIns="71437" tIns="71437" rIns="71437" bIns="71437">
+            <a:normAutofit fontScale="100000" lnSpcReduction="0"/>
+          </a:bodyPr>
+          <a:lstStyle>
+            <a:lvl1pPr algn="ctr">
+              <a:lnSpc>
+                <a:spcPct val="80000"/>
+              </a:lnSpc>
+              <a:spcBef>
+                <a:spcPts val="0"/>
+              </a:spcBef>
+              <a:defRPr cap="all" sz="8000">
+                <a:solidFill>
+                  <a:srgbClr val="66C2FF"/>
+                </a:solidFill>
+                <a:latin typeface="+mn-lt"/>
+                <a:ea typeface="+mn-ea"/>
+                <a:cs typeface="+mn-cs"/>
+                <a:sym typeface="DIN Condensed"/>
+              </a:defRPr>
+            </a:lvl1pPr>
+          </a:lstStyle>
+          <a:p>
+            <a:pPr/>
+            <a:r>
+              <a:t>import path checking is disabled for vendor</a:t>
+            </a:r>
+          </a:p>
+        </p:txBody>
+      </p:sp>
+      <p:pic>
+        <p:nvPicPr>
+          <p:cNvPr id="474" name="cubes.png" descr="cubes.png"/>
+          <p:cNvPicPr>
+            <a:picLocks noChangeAspect="1"/>
+          </p:cNvPicPr>
+          <p:nvPr/>
+        </p:nvPicPr>
+        <p:blipFill>
+          <a:blip r:embed="rId2">
+            <a:extLst/>
+          </a:blip>
+          <a:stretch>
+            <a:fillRect/>
+          </a:stretch>
+        </p:blipFill>
+        <p:spPr>
+          <a:xfrm>
+            <a:off x="22225000" y="2032000"/>
+            <a:ext cx="1270000" cy="1270000"/>
+          </a:xfrm>
+          <a:prstGeom prst="rect">
+            <a:avLst/>
+          </a:prstGeom>
+          <a:ln w="12700">
+            <a:miter lim="400000"/>
+          </a:ln>
+        </p:spPr>
+      </p:pic>
+      <p:pic>
+        <p:nvPicPr>
+          <p:cNvPr id="475" name="no-entry.png" descr="no-entry.png"/>
+          <p:cNvPicPr>
+            <a:picLocks noChangeAspect="1"/>
+          </p:cNvPicPr>
+          <p:nvPr/>
+        </p:nvPicPr>
+        <p:blipFill>
+          <a:blip r:embed="rId3">
+            <a:extLst/>
+          </a:blip>
+          <a:stretch>
+            <a:fillRect/>
+          </a:stretch>
+        </p:blipFill>
+        <p:spPr>
+          <a:xfrm>
+            <a:off x="8940800" y="4533900"/>
+            <a:ext cx="6502400" cy="6502400"/>
+          </a:xfrm>
+          <a:prstGeom prst="rect">
+            <a:avLst/>
+          </a:prstGeom>
+          <a:ln w="12700">
+            <a:miter lim="400000"/>
+          </a:ln>
+        </p:spPr>
+      </p:pic>
+    </p:spTree>
+  </p:cSld>
+  <p:clrMapOvr>
+    <a:masterClrMapping/>
+  </p:clrMapOvr>
+  <mc:AlternateContent xmlns:mc="http://schemas.openxmlformats.org/markup-compatibility/2006">
+    <mc:Choice xmlns:p14="http://schemas.microsoft.com/office/powerpoint/2010/main" Requires="p14">
+      <p:transition spd="fast" advClick="1" p14:dur="699">
+        <p:push dir="l"/>
+      </p:transition>
+    </mc:Choice>
+    <mc:Fallback>
+      <p:transition spd="fast">
+        <p:fade/>
+      </p:transition>
+    </mc:Fallback>
+  </mc:AlternateContent>
+  <p:timing>
+    <p:tnLst>
+      <p:par>
+        <p:cTn id="1" nodeType="tmRoot" restart="never" dur="indefinite" fill="hold">
+          <p:childTnLst>
+            <p:seq concurrent="1" prevAc="none" nextAc="seek">
+              <p:cTn id="2" nodeType="mainSeq" dur="indefinite" fill="hold">
+                <p:childTnLst>
+                  <p:par>
+                    <p:cTn id="3" fill="hold">
+                      <p:stCondLst>
+                        <p:cond delay="indefinite"/>
+                        <p:cond evt="onBegin">
+                          <p:tn val="2"/>
+                        </p:cond>
+                      </p:stCondLst>
+                      <p:childTnLst>
+                        <p:par>
+                          <p:cTn id="4" fill="hold">
+                            <p:stCondLst>
+                              <p:cond delay="0"/>
+                            </p:stCondLst>
+                            <p:childTnLst>
+                              <p:par>
+                                <p:cTn id="5" presetClass="emph" nodeType="afterEffect" presetSubtype="0" presetID="35" grpId="1" repeatCount="2000" fill="hold">
+                                  <p:stCondLst>
+                                    <p:cond delay="0"/>
+                                  </p:stCondLst>
+                                  <p:childTnLst>
+                                    <p:anim calcmode="discrete" valueType="str">
+                                      <p:cBhvr>
+                                        <p:cTn id="6" dur="600" fill="hold"/>
+                                        <p:tgtEl>
+                                          <p:spTgt spid="475"/>
+                                        </p:tgtEl>
+                                        <p:attrNameLst>
+                                          <p:attrName>style.visibility</p:attrName>
+                                        </p:attrNameLst>
+                                      </p:cBhvr>
+                                      <p:tavLst>
+                                        <p:tav tm="0">
+                                          <p:val>
+                                            <p:strVal val="hidden"/>
+                                          </p:val>
+                                        </p:tav>
+                                        <p:tav tm="50000">
+                                          <p:val>
+                                            <p:strVal val="visible"/>
+                                          </p:val>
+                                        </p:tav>
+                                      </p:tavLst>
+                                    </p:anim>
+                                  </p:childTnLst>
+                                </p:cTn>
+                              </p:par>
+                            </p:childTnLst>
+                          </p:cTn>
+                        </p:par>
+                      </p:childTnLst>
+                    </p:cTn>
+                  </p:par>
+                </p:childTnLst>
+              </p:cTn>
+              <p:prevCondLst>
+                <p:cond evt="onPrev">
+                  <p:tgtEl>
+                    <p:sldTgt/>
+                  </p:tgtEl>
+                </p:cond>
+              </p:prevCondLst>
+              <p:nextCondLst>
+                <p:cond evt="onNext">
+                  <p:tgtEl>
+                    <p:sldTgt/>
+                  </p:tgtEl>
+                </p:cond>
+              </p:nextCondLst>
+            </p:seq>
+          </p:childTnLst>
+        </p:cTn>
+      </p:par>
+    </p:tnLst>
+    <p:bldLst>
+      <p:bldP build="whole" bldLvl="1" animBg="1" rev="0" advAuto="0" spid="475" grpId="1"/>
     </p:bldLst>
   </p:timing>
 </p:sld>

</xml_diff>